<commit_message>
tested briefing and distribution api and updated ppt
</commit_message>
<xml_diff>
--- a/Presentation1.pptx
+++ b/Presentation1.pptx
@@ -16,6 +16,8 @@
     <p:sldId id="262" r:id="rId10"/>
     <p:sldId id="263" r:id="rId11"/>
     <p:sldId id="264" r:id="rId12"/>
+    <p:sldId id="269" r:id="rId13"/>
+    <p:sldId id="268" r:id="rId14"/>
   </p:sldIdLst>
   <p:sldSz cx="12192000" cy="6858000"/>
   <p:notesSz cx="6858000" cy="9144000"/>
@@ -114,6 +116,11 @@
       </a:defRPr>
     </a:lvl9pPr>
   </p:defaultTextStyle>
+  <p:extLst>
+    <p:ext uri="{EFAFB233-063F-42B5-8137-9DF3F51BA10A}">
+      <p15:sldGuideLst xmlns:p15="http://schemas.microsoft.com/office/powerpoint/2012/main"/>
+    </p:ext>
+  </p:extLst>
 </p:presentation>
 </file>
 
@@ -3379,7 +3386,7 @@
         <p:spPr/>
         <p:txBody>
           <a:bodyPr>
-            <a:normAutofit lnSpcReduction="10000"/>
+            <a:normAutofit fontScale="92500" lnSpcReduction="10000"/>
           </a:bodyPr>
           <a:lstStyle/>
           <a:p>
@@ -3438,6 +3445,24 @@
             <a:r>
               <a:rPr lang="en-US" dirty="0"/>
               <a:t>an intermediary between the repository and the API controller.</a:t>
+            </a:r>
+          </a:p>
+          <a:p>
+            <a:r>
+              <a:rPr lang="da-DK" dirty="0"/>
+              <a:t>Security: </a:t>
+            </a:r>
+            <a:r>
+              <a:rPr lang="da-DK" dirty="0" err="1"/>
+              <a:t>authentication</a:t>
+            </a:r>
+            <a:r>
+              <a:rPr lang="da-DK" dirty="0"/>
+              <a:t> with </a:t>
+            </a:r>
+            <a:r>
+              <a:rPr lang="da-DK" dirty="0" err="1"/>
+              <a:t>jwt</a:t>
             </a:r>
             <a:endParaRPr lang="da-DK" dirty="0"/>
           </a:p>
@@ -3692,6 +3717,190 @@
     <p:extLst>
       <p:ext uri="{BB962C8B-B14F-4D97-AF65-F5344CB8AC3E}">
         <p14:creationId xmlns:p14="http://schemas.microsoft.com/office/powerpoint/2010/main" val="2901000699"/>
+      </p:ext>
+    </p:extLst>
+  </p:cSld>
+  <p:clrMapOvr>
+    <a:masterClrMapping/>
+  </p:clrMapOvr>
+</p:sld>
+</file>
+
+<file path=ppt/slides/slide12.xml><?xml version="1.0" encoding="utf-8"?>
+<p:sld xmlns:a="http://schemas.openxmlformats.org/drawingml/2006/main" xmlns:r="http://schemas.openxmlformats.org/officeDocument/2006/relationships" xmlns:p="http://schemas.openxmlformats.org/presentationml/2006/main">
+  <p:cSld>
+    <p:spTree>
+      <p:nvGrpSpPr>
+        <p:cNvPr id="1" name=""/>
+        <p:cNvGrpSpPr/>
+        <p:nvPr/>
+      </p:nvGrpSpPr>
+      <p:grpSpPr>
+        <a:xfrm>
+          <a:off x="0" y="0"/>
+          <a:ext cx="0" cy="0"/>
+          <a:chOff x="0" y="0"/>
+          <a:chExt cx="0" cy="0"/>
+        </a:xfrm>
+      </p:grpSpPr>
+      <p:sp>
+        <p:nvSpPr>
+          <p:cNvPr id="2" name="Title 1">
+            <a:extLst>
+              <a:ext uri="{FF2B5EF4-FFF2-40B4-BE49-F238E27FC236}">
+                <a16:creationId xmlns:a16="http://schemas.microsoft.com/office/drawing/2014/main" id="{5DA416A9-1990-E936-E282-E706F2E407AB}"/>
+              </a:ext>
+            </a:extLst>
+          </p:cNvPr>
+          <p:cNvSpPr>
+            <a:spLocks noGrp="1"/>
+          </p:cNvSpPr>
+          <p:nvPr>
+            <p:ph type="title"/>
+          </p:nvPr>
+        </p:nvSpPr>
+        <p:spPr/>
+        <p:txBody>
+          <a:bodyPr/>
+          <a:lstStyle/>
+          <a:p>
+            <a:r>
+              <a:rPr lang="da-DK" dirty="0" err="1"/>
+              <a:t>Get</a:t>
+            </a:r>
+            <a:r>
+              <a:rPr lang="da-DK" dirty="0"/>
+              <a:t> all briefing metadata</a:t>
+            </a:r>
+            <a:endParaRPr lang="en-US" dirty="0"/>
+          </a:p>
+        </p:txBody>
+      </p:sp>
+      <p:pic>
+        <p:nvPicPr>
+          <p:cNvPr id="5" name="Content Placeholder 4">
+            <a:extLst>
+              <a:ext uri="{FF2B5EF4-FFF2-40B4-BE49-F238E27FC236}">
+                <a16:creationId xmlns:a16="http://schemas.microsoft.com/office/drawing/2014/main" id="{70CAC1AA-9443-F5A9-3882-73F871D267CB}"/>
+              </a:ext>
+            </a:extLst>
+          </p:cNvPr>
+          <p:cNvPicPr>
+            <a:picLocks noGrp="1" noChangeAspect="1"/>
+          </p:cNvPicPr>
+          <p:nvPr>
+            <p:ph idx="1"/>
+          </p:nvPr>
+        </p:nvPicPr>
+        <p:blipFill>
+          <a:blip r:embed="rId2"/>
+          <a:stretch>
+            <a:fillRect/>
+          </a:stretch>
+        </p:blipFill>
+        <p:spPr>
+          <a:xfrm>
+            <a:off x="2366890" y="1825625"/>
+            <a:ext cx="7458219" cy="4351338"/>
+          </a:xfrm>
+        </p:spPr>
+      </p:pic>
+    </p:spTree>
+    <p:extLst>
+      <p:ext uri="{BB962C8B-B14F-4D97-AF65-F5344CB8AC3E}">
+        <p14:creationId xmlns:p14="http://schemas.microsoft.com/office/powerpoint/2010/main" val="3036680082"/>
+      </p:ext>
+    </p:extLst>
+  </p:cSld>
+  <p:clrMapOvr>
+    <a:masterClrMapping/>
+  </p:clrMapOvr>
+</p:sld>
+</file>
+
+<file path=ppt/slides/slide13.xml><?xml version="1.0" encoding="utf-8"?>
+<p:sld xmlns:a="http://schemas.openxmlformats.org/drawingml/2006/main" xmlns:r="http://schemas.openxmlformats.org/officeDocument/2006/relationships" xmlns:p="http://schemas.openxmlformats.org/presentationml/2006/main">
+  <p:cSld>
+    <p:spTree>
+      <p:nvGrpSpPr>
+        <p:cNvPr id="1" name=""/>
+        <p:cNvGrpSpPr/>
+        <p:nvPr/>
+      </p:nvGrpSpPr>
+      <p:grpSpPr>
+        <a:xfrm>
+          <a:off x="0" y="0"/>
+          <a:ext cx="0" cy="0"/>
+          <a:chOff x="0" y="0"/>
+          <a:chExt cx="0" cy="0"/>
+        </a:xfrm>
+      </p:grpSpPr>
+      <p:sp>
+        <p:nvSpPr>
+          <p:cNvPr id="2" name="Title 1">
+            <a:extLst>
+              <a:ext uri="{FF2B5EF4-FFF2-40B4-BE49-F238E27FC236}">
+                <a16:creationId xmlns:a16="http://schemas.microsoft.com/office/drawing/2014/main" id="{6AB03894-34BB-CE07-A2C8-05BBFA3E1E21}"/>
+              </a:ext>
+            </a:extLst>
+          </p:cNvPr>
+          <p:cNvSpPr>
+            <a:spLocks noGrp="1"/>
+          </p:cNvSpPr>
+          <p:nvPr>
+            <p:ph type="title"/>
+          </p:nvPr>
+        </p:nvSpPr>
+        <p:spPr/>
+        <p:txBody>
+          <a:bodyPr/>
+          <a:lstStyle/>
+          <a:p>
+            <a:r>
+              <a:rPr lang="da-DK" dirty="0" err="1"/>
+              <a:t>Get</a:t>
+            </a:r>
+            <a:r>
+              <a:rPr lang="da-DK" dirty="0"/>
+              <a:t> all distribution metadata</a:t>
+            </a:r>
+            <a:endParaRPr lang="en-US" dirty="0"/>
+          </a:p>
+        </p:txBody>
+      </p:sp>
+      <p:pic>
+        <p:nvPicPr>
+          <p:cNvPr id="5" name="Content Placeholder 4">
+            <a:extLst>
+              <a:ext uri="{FF2B5EF4-FFF2-40B4-BE49-F238E27FC236}">
+                <a16:creationId xmlns:a16="http://schemas.microsoft.com/office/drawing/2014/main" id="{FD12842D-F4F8-936F-9E1C-F08BDB5E6264}"/>
+              </a:ext>
+            </a:extLst>
+          </p:cNvPr>
+          <p:cNvPicPr>
+            <a:picLocks noGrp="1" noChangeAspect="1"/>
+          </p:cNvPicPr>
+          <p:nvPr>
+            <p:ph idx="1"/>
+          </p:nvPr>
+        </p:nvPicPr>
+        <p:blipFill>
+          <a:blip r:embed="rId2"/>
+          <a:stretch>
+            <a:fillRect/>
+          </a:stretch>
+        </p:blipFill>
+        <p:spPr>
+          <a:xfrm>
+            <a:off x="2438845" y="1825625"/>
+            <a:ext cx="7314310" cy="4351338"/>
+          </a:xfrm>
+        </p:spPr>
+      </p:pic>
+    </p:spTree>
+    <p:extLst>
+      <p:ext uri="{BB962C8B-B14F-4D97-AF65-F5344CB8AC3E}">
+        <p14:creationId xmlns:p14="http://schemas.microsoft.com/office/powerpoint/2010/main" val="3862537018"/>
       </p:ext>
     </p:extLst>
   </p:cSld>

</xml_diff>

<commit_message>
added data annotation and update updated method to avoid concurrency issue. Updated PPT
</commit_message>
<xml_diff>
--- a/Presentation1.pptx
+++ b/Presentation1.pptx
@@ -5,32 +5,33 @@
     <p:sldMasterId id="2147483648" r:id="rId1"/>
   </p:sldMasterIdLst>
   <p:sldIdLst>
-    <p:sldId id="270" r:id="rId2"/>
-    <p:sldId id="265" r:id="rId3"/>
-    <p:sldId id="281" r:id="rId4"/>
-    <p:sldId id="282" r:id="rId5"/>
-    <p:sldId id="283" r:id="rId6"/>
-    <p:sldId id="273" r:id="rId7"/>
-    <p:sldId id="266" r:id="rId8"/>
-    <p:sldId id="277" r:id="rId9"/>
-    <p:sldId id="274" r:id="rId10"/>
-    <p:sldId id="275" r:id="rId11"/>
-    <p:sldId id="276" r:id="rId12"/>
-    <p:sldId id="278" r:id="rId13"/>
-    <p:sldId id="272" r:id="rId14"/>
-    <p:sldId id="279" r:id="rId15"/>
-    <p:sldId id="280" r:id="rId16"/>
-    <p:sldId id="267" r:id="rId17"/>
-    <p:sldId id="257" r:id="rId18"/>
-    <p:sldId id="258" r:id="rId19"/>
-    <p:sldId id="259" r:id="rId20"/>
-    <p:sldId id="260" r:id="rId21"/>
-    <p:sldId id="261" r:id="rId22"/>
-    <p:sldId id="262" r:id="rId23"/>
-    <p:sldId id="263" r:id="rId24"/>
-    <p:sldId id="264" r:id="rId25"/>
-    <p:sldId id="269" r:id="rId26"/>
-    <p:sldId id="268" r:id="rId27"/>
+    <p:sldId id="284" r:id="rId2"/>
+    <p:sldId id="270" r:id="rId3"/>
+    <p:sldId id="265" r:id="rId4"/>
+    <p:sldId id="273" r:id="rId5"/>
+    <p:sldId id="266" r:id="rId6"/>
+    <p:sldId id="281" r:id="rId7"/>
+    <p:sldId id="282" r:id="rId8"/>
+    <p:sldId id="283" r:id="rId9"/>
+    <p:sldId id="272" r:id="rId10"/>
+    <p:sldId id="277" r:id="rId11"/>
+    <p:sldId id="274" r:id="rId12"/>
+    <p:sldId id="275" r:id="rId13"/>
+    <p:sldId id="276" r:id="rId14"/>
+    <p:sldId id="278" r:id="rId15"/>
+    <p:sldId id="279" r:id="rId16"/>
+    <p:sldId id="280" r:id="rId17"/>
+    <p:sldId id="267" r:id="rId18"/>
+    <p:sldId id="257" r:id="rId19"/>
+    <p:sldId id="258" r:id="rId20"/>
+    <p:sldId id="259" r:id="rId21"/>
+    <p:sldId id="260" r:id="rId22"/>
+    <p:sldId id="261" r:id="rId23"/>
+    <p:sldId id="262" r:id="rId24"/>
+    <p:sldId id="263" r:id="rId25"/>
+    <p:sldId id="264" r:id="rId26"/>
+    <p:sldId id="269" r:id="rId27"/>
+    <p:sldId id="268" r:id="rId28"/>
   </p:sldIdLst>
   <p:sldSz cx="12192000" cy="6858000"/>
   <p:notesSz cx="6858000" cy="9144000"/>
@@ -284,7 +285,7 @@
           <a:p>
             <a:fld id="{9681E93A-1611-4500-95B8-57D337128561}" type="datetimeFigureOut">
               <a:rPr lang="en-US" smtClean="0"/>
-              <a:t>9/22/2024</a:t>
+              <a:t>9/25/2024</a:t>
             </a:fld>
             <a:endParaRPr lang="en-US"/>
           </a:p>
@@ -482,7 +483,7 @@
           <a:p>
             <a:fld id="{9681E93A-1611-4500-95B8-57D337128561}" type="datetimeFigureOut">
               <a:rPr lang="en-US" smtClean="0"/>
-              <a:t>9/22/2024</a:t>
+              <a:t>9/25/2024</a:t>
             </a:fld>
             <a:endParaRPr lang="en-US"/>
           </a:p>
@@ -690,7 +691,7 @@
           <a:p>
             <a:fld id="{9681E93A-1611-4500-95B8-57D337128561}" type="datetimeFigureOut">
               <a:rPr lang="en-US" smtClean="0"/>
-              <a:t>9/22/2024</a:t>
+              <a:t>9/25/2024</a:t>
             </a:fld>
             <a:endParaRPr lang="en-US"/>
           </a:p>
@@ -888,7 +889,7 @@
           <a:p>
             <a:fld id="{9681E93A-1611-4500-95B8-57D337128561}" type="datetimeFigureOut">
               <a:rPr lang="en-US" smtClean="0"/>
-              <a:t>9/22/2024</a:t>
+              <a:t>9/25/2024</a:t>
             </a:fld>
             <a:endParaRPr lang="en-US"/>
           </a:p>
@@ -1163,7 +1164,7 @@
           <a:p>
             <a:fld id="{9681E93A-1611-4500-95B8-57D337128561}" type="datetimeFigureOut">
               <a:rPr lang="en-US" smtClean="0"/>
-              <a:t>9/22/2024</a:t>
+              <a:t>9/25/2024</a:t>
             </a:fld>
             <a:endParaRPr lang="en-US"/>
           </a:p>
@@ -1428,7 +1429,7 @@
           <a:p>
             <a:fld id="{9681E93A-1611-4500-95B8-57D337128561}" type="datetimeFigureOut">
               <a:rPr lang="en-US" smtClean="0"/>
-              <a:t>9/22/2024</a:t>
+              <a:t>9/25/2024</a:t>
             </a:fld>
             <a:endParaRPr lang="en-US"/>
           </a:p>
@@ -1840,7 +1841,7 @@
           <a:p>
             <a:fld id="{9681E93A-1611-4500-95B8-57D337128561}" type="datetimeFigureOut">
               <a:rPr lang="en-US" smtClean="0"/>
-              <a:t>9/22/2024</a:t>
+              <a:t>9/25/2024</a:t>
             </a:fld>
             <a:endParaRPr lang="en-US"/>
           </a:p>
@@ -1981,7 +1982,7 @@
           <a:p>
             <a:fld id="{9681E93A-1611-4500-95B8-57D337128561}" type="datetimeFigureOut">
               <a:rPr lang="en-US" smtClean="0"/>
-              <a:t>9/22/2024</a:t>
+              <a:t>9/25/2024</a:t>
             </a:fld>
             <a:endParaRPr lang="en-US"/>
           </a:p>
@@ -2094,7 +2095,7 @@
           <a:p>
             <a:fld id="{9681E93A-1611-4500-95B8-57D337128561}" type="datetimeFigureOut">
               <a:rPr lang="en-US" smtClean="0"/>
-              <a:t>9/22/2024</a:t>
+              <a:t>9/25/2024</a:t>
             </a:fld>
             <a:endParaRPr lang="en-US"/>
           </a:p>
@@ -2405,7 +2406,7 @@
           <a:p>
             <a:fld id="{9681E93A-1611-4500-95B8-57D337128561}" type="datetimeFigureOut">
               <a:rPr lang="en-US" smtClean="0"/>
-              <a:t>9/22/2024</a:t>
+              <a:t>9/25/2024</a:t>
             </a:fld>
             <a:endParaRPr lang="en-US"/>
           </a:p>
@@ -2693,7 +2694,7 @@
           <a:p>
             <a:fld id="{9681E93A-1611-4500-95B8-57D337128561}" type="datetimeFigureOut">
               <a:rPr lang="en-US" smtClean="0"/>
-              <a:t>9/22/2024</a:t>
+              <a:t>9/25/2024</a:t>
             </a:fld>
             <a:endParaRPr lang="en-US"/>
           </a:p>
@@ -2934,7 +2935,7 @@
           <a:p>
             <a:fld id="{9681E93A-1611-4500-95B8-57D337128561}" type="datetimeFigureOut">
               <a:rPr lang="en-US" smtClean="0"/>
-              <a:t>9/22/2024</a:t>
+              <a:t>9/25/2024</a:t>
             </a:fld>
             <a:endParaRPr lang="en-US"/>
           </a:p>
@@ -3356,7 +3357,7 @@
           <p:cNvPr id="2" name="Title 1">
             <a:extLst>
               <a:ext uri="{FF2B5EF4-FFF2-40B4-BE49-F238E27FC236}">
-                <a16:creationId xmlns:a16="http://schemas.microsoft.com/office/drawing/2014/main" id="{56023F36-27A8-7FFB-C638-35A36A033D2E}"/>
+                <a16:creationId xmlns:a16="http://schemas.microsoft.com/office/drawing/2014/main" id="{018CA356-D275-7955-D5CE-0E145D19F62F}"/>
               </a:ext>
             </a:extLst>
           </p:cNvPr>
@@ -3374,7 +3375,7 @@
           <a:p>
             <a:r>
               <a:rPr lang="da-DK" dirty="0"/>
-              <a:t>Overview</a:t>
+              <a:t>Agenda</a:t>
             </a:r>
             <a:endParaRPr lang="en-US" dirty="0"/>
           </a:p>
@@ -3385,7 +3386,7 @@
           <p:cNvPr id="3" name="Content Placeholder 2">
             <a:extLst>
               <a:ext uri="{FF2B5EF4-FFF2-40B4-BE49-F238E27FC236}">
-                <a16:creationId xmlns:a16="http://schemas.microsoft.com/office/drawing/2014/main" id="{9527659D-85B0-8BDE-4FF4-C6F35839193B}"/>
+                <a16:creationId xmlns:a16="http://schemas.microsoft.com/office/drawing/2014/main" id="{59AF75AC-5965-A8F4-DDA3-4E1700247574}"/>
               </a:ext>
             </a:extLst>
           </p:cNvPr>
@@ -3402,28 +3403,71 @@
           <a:lstStyle/>
           <a:p>
             <a:r>
-              <a:rPr lang="en-US" dirty="0"/>
-              <a:t>The Solution is a set of RESTful APIs designed to manage digital assets, briefings, and content distribution metadata.</a:t>
-            </a:r>
-          </a:p>
-          <a:p>
-            <a:r>
-              <a:rPr lang="en-US" dirty="0"/>
-              <a:t>Aimed to streamline the management and distribution of multimedia assets for various channels and platforms.</a:t>
-            </a:r>
-          </a:p>
-          <a:p>
-            <a:r>
-              <a:rPr lang="en-US" dirty="0"/>
-              <a:t>Objective: scalable, maintainable, secure architecture, easy integration with other services.</a:t>
-            </a:r>
+              <a:rPr lang="da-DK" dirty="0" err="1"/>
+              <a:t>Overivew</a:t>
+            </a:r>
+            <a:endParaRPr lang="da-DK" dirty="0"/>
+          </a:p>
+          <a:p>
+            <a:r>
+              <a:rPr lang="da-DK" dirty="0" err="1"/>
+              <a:t>Structure</a:t>
+            </a:r>
+            <a:r>
+              <a:rPr lang="da-DK" dirty="0"/>
+              <a:t> and </a:t>
+            </a:r>
+            <a:r>
+              <a:rPr lang="da-DK" dirty="0" err="1"/>
+              <a:t>Architecure</a:t>
+            </a:r>
+            <a:endParaRPr lang="da-DK" dirty="0"/>
+          </a:p>
+          <a:p>
+            <a:r>
+              <a:rPr lang="da-DK" dirty="0"/>
+              <a:t>Components of </a:t>
+            </a:r>
+            <a:r>
+              <a:rPr lang="da-DK" dirty="0" err="1"/>
+              <a:t>APIs</a:t>
+            </a:r>
+            <a:endParaRPr lang="da-DK" dirty="0"/>
+          </a:p>
+          <a:p>
+            <a:r>
+              <a:rPr lang="da-DK" dirty="0"/>
+              <a:t>API </a:t>
+            </a:r>
+            <a:r>
+              <a:rPr lang="da-DK" dirty="0" err="1"/>
+              <a:t>Example</a:t>
+            </a:r>
+            <a:endParaRPr lang="da-DK" dirty="0"/>
+          </a:p>
+          <a:p>
+            <a:r>
+              <a:rPr lang="da-DK" dirty="0"/>
+              <a:t>Test </a:t>
+            </a:r>
+            <a:r>
+              <a:rPr lang="da-DK" dirty="0" err="1"/>
+              <a:t>APIs</a:t>
+            </a:r>
+            <a:endParaRPr lang="da-DK" dirty="0"/>
+          </a:p>
+          <a:p>
+            <a:endParaRPr lang="da-DK" dirty="0"/>
+          </a:p>
+          <a:p>
+            <a:endParaRPr lang="en-US" dirty="0"/>
           </a:p>
         </p:txBody>
       </p:sp>
     </p:spTree>
     <p:extLst>
       <p:ext uri="{BB962C8B-B14F-4D97-AF65-F5344CB8AC3E}">
-        <p14:creationId xmlns:p14="http://schemas.microsoft.com/office/powerpoint/2010/main" val="855457144"/>
+        <p14:creationId xmlns:p14="http://schemas.microsoft.com/office/powerpoint/2010/main" val="3989991685"/>
       </p:ext>
     </p:extLst>
   </p:cSld>
@@ -3455,7 +3499,7 @@
           <p:cNvPr id="2" name="Title 1">
             <a:extLst>
               <a:ext uri="{FF2B5EF4-FFF2-40B4-BE49-F238E27FC236}">
-                <a16:creationId xmlns:a16="http://schemas.microsoft.com/office/drawing/2014/main" id="{4D9C5160-A855-1232-4208-E4D5B2C5D3B9}"/>
+                <a16:creationId xmlns:a16="http://schemas.microsoft.com/office/drawing/2014/main" id="{F02EEB8F-5CE0-4FC5-9BA1-0C505B693960}"/>
               </a:ext>
             </a:extLst>
           </p:cNvPr>
@@ -3472,12 +3516,12 @@
           <a:lstStyle/>
           <a:p>
             <a:r>
-              <a:rPr lang="da-DK" dirty="0"/>
-              <a:t>Asset Metadata </a:t>
-            </a:r>
-            <a:r>
-              <a:rPr lang="da-DK" dirty="0" err="1"/>
-              <a:t>Endpoint</a:t>
+              <a:rPr lang="da-DK" dirty="0" err="1"/>
+              <a:t>Auth</a:t>
+            </a:r>
+            <a:r>
+              <a:rPr lang="da-DK" dirty="0"/>
+              <a:t> API</a:t>
             </a:r>
             <a:endParaRPr lang="en-US" dirty="0"/>
           </a:p>
@@ -3488,7 +3532,7 @@
           <p:cNvPr id="3" name="Content Placeholder 2">
             <a:extLst>
               <a:ext uri="{FF2B5EF4-FFF2-40B4-BE49-F238E27FC236}">
-                <a16:creationId xmlns:a16="http://schemas.microsoft.com/office/drawing/2014/main" id="{4608E24B-EB1C-365C-B13A-BE3ED57BCF67}"/>
+                <a16:creationId xmlns:a16="http://schemas.microsoft.com/office/drawing/2014/main" id="{EFB92E96-BEE2-3015-D7C0-B631F73D8DD3}"/>
               </a:ext>
             </a:extLst>
           </p:cNvPr>
@@ -3505,80 +3549,52 @@
           <a:lstStyle/>
           <a:p>
             <a:r>
-              <a:rPr lang="en-US" dirty="0"/>
-              <a:t>GET /</a:t>
-            </a:r>
-            <a:r>
-              <a:rPr lang="en-US" dirty="0" err="1"/>
-              <a:t>api</a:t>
-            </a:r>
-            <a:r>
-              <a:rPr lang="en-US" dirty="0"/>
-              <a:t>/assets</a:t>
-            </a:r>
-          </a:p>
-          <a:p>
-            <a:r>
-              <a:rPr lang="en-US" dirty="0"/>
-              <a:t>GET /</a:t>
-            </a:r>
-            <a:r>
-              <a:rPr lang="en-US" dirty="0" err="1"/>
-              <a:t>api</a:t>
-            </a:r>
-            <a:r>
-              <a:rPr lang="en-US" dirty="0"/>
-              <a:t>/assets/{id}</a:t>
-            </a:r>
-          </a:p>
-          <a:p>
-            <a:r>
-              <a:rPr lang="en-US" dirty="0"/>
-              <a:t>POST /</a:t>
-            </a:r>
-            <a:r>
-              <a:rPr lang="en-US" dirty="0" err="1"/>
-              <a:t>api</a:t>
-            </a:r>
-            <a:r>
-              <a:rPr lang="en-US" dirty="0"/>
-              <a:t>/assets</a:t>
-            </a:r>
-          </a:p>
-          <a:p>
-            <a:r>
-              <a:rPr lang="en-US" dirty="0"/>
-              <a:t>PUT /</a:t>
-            </a:r>
-            <a:r>
-              <a:rPr lang="en-US" dirty="0" err="1"/>
-              <a:t>api</a:t>
-            </a:r>
-            <a:r>
-              <a:rPr lang="en-US" dirty="0"/>
-              <a:t>/assets/{id}</a:t>
-            </a:r>
-          </a:p>
-          <a:p>
-            <a:r>
-              <a:rPr lang="en-US" dirty="0"/>
-              <a:t>DELETE /</a:t>
-            </a:r>
-            <a:r>
-              <a:rPr lang="en-US" dirty="0" err="1"/>
-              <a:t>api</a:t>
-            </a:r>
-            <a:r>
-              <a:rPr lang="en-US" dirty="0"/>
-              <a:t>/assets/{id}</a:t>
-            </a:r>
+              <a:rPr lang="da-DK" dirty="0"/>
+              <a:t>Authentication for JWT </a:t>
+            </a:r>
+            <a:r>
+              <a:rPr lang="da-DK" dirty="0" err="1"/>
+              <a:t>token</a:t>
+            </a:r>
+            <a:endParaRPr lang="da-DK" dirty="0"/>
+          </a:p>
+          <a:p>
+            <a:r>
+              <a:rPr lang="da-DK" dirty="0" err="1"/>
+              <a:t>Role</a:t>
+            </a:r>
+            <a:r>
+              <a:rPr lang="da-DK" dirty="0"/>
+              <a:t> </a:t>
+            </a:r>
+            <a:r>
+              <a:rPr lang="da-DK" dirty="0" err="1"/>
+              <a:t>based</a:t>
+            </a:r>
+            <a:r>
+              <a:rPr lang="da-DK" dirty="0"/>
+              <a:t> </a:t>
+            </a:r>
+            <a:r>
+              <a:rPr lang="da-DK" dirty="0" err="1"/>
+              <a:t>access</a:t>
+            </a:r>
+            <a:r>
+              <a:rPr lang="da-DK" dirty="0"/>
+              <a:t> </a:t>
+            </a:r>
+            <a:r>
+              <a:rPr lang="da-DK" dirty="0" err="1"/>
+              <a:t>control</a:t>
+            </a:r>
+            <a:endParaRPr lang="en-US" dirty="0"/>
           </a:p>
         </p:txBody>
       </p:sp>
     </p:spTree>
     <p:extLst>
       <p:ext uri="{BB962C8B-B14F-4D97-AF65-F5344CB8AC3E}">
-        <p14:creationId xmlns:p14="http://schemas.microsoft.com/office/powerpoint/2010/main" val="3495572024"/>
+        <p14:creationId xmlns:p14="http://schemas.microsoft.com/office/powerpoint/2010/main" val="2758313692"/>
       </p:ext>
     </p:extLst>
   </p:cSld>
@@ -3610,7 +3626,7 @@
           <p:cNvPr id="2" name="Title 1">
             <a:extLst>
               <a:ext uri="{FF2B5EF4-FFF2-40B4-BE49-F238E27FC236}">
-                <a16:creationId xmlns:a16="http://schemas.microsoft.com/office/drawing/2014/main" id="{868E5AE8-1844-E2EF-A928-51E488917DE3}"/>
+                <a16:creationId xmlns:a16="http://schemas.microsoft.com/office/drawing/2014/main" id="{F73FA1DB-C0A6-3AC9-7809-227394474E99}"/>
               </a:ext>
             </a:extLst>
           </p:cNvPr>
@@ -3628,11 +3644,7 @@
           <a:p>
             <a:r>
               <a:rPr lang="da-DK" dirty="0"/>
-              <a:t>Briefing </a:t>
-            </a:r>
-            <a:r>
-              <a:rPr lang="da-DK" dirty="0" err="1"/>
-              <a:t>Endpoint</a:t>
+              <a:t>Asset Management API</a:t>
             </a:r>
             <a:endParaRPr lang="en-US" dirty="0"/>
           </a:p>
@@ -3643,7 +3655,7 @@
           <p:cNvPr id="3" name="Content Placeholder 2">
             <a:extLst>
               <a:ext uri="{FF2B5EF4-FFF2-40B4-BE49-F238E27FC236}">
-                <a16:creationId xmlns:a16="http://schemas.microsoft.com/office/drawing/2014/main" id="{24CBE445-2CF6-E54D-2642-47998DC1635D}"/>
+                <a16:creationId xmlns:a16="http://schemas.microsoft.com/office/drawing/2014/main" id="{184254C1-79A2-6A00-C13E-06216805DFF1}"/>
               </a:ext>
             </a:extLst>
           </p:cNvPr>
@@ -3660,80 +3672,49 @@
           <a:lstStyle/>
           <a:p>
             <a:r>
-              <a:rPr lang="en-US" dirty="0"/>
-              <a:t>GET /</a:t>
-            </a:r>
-            <a:r>
-              <a:rPr lang="en-US" dirty="0" err="1"/>
-              <a:t>api</a:t>
-            </a:r>
-            <a:r>
-              <a:rPr lang="en-US" dirty="0"/>
-              <a:t>/briefings</a:t>
-            </a:r>
-          </a:p>
-          <a:p>
-            <a:r>
-              <a:rPr lang="en-US" dirty="0"/>
-              <a:t>GET /</a:t>
-            </a:r>
-            <a:r>
-              <a:rPr lang="en-US" dirty="0" err="1"/>
-              <a:t>api</a:t>
-            </a:r>
-            <a:r>
-              <a:rPr lang="en-US" dirty="0"/>
-              <a:t>/briefings/{id}</a:t>
-            </a:r>
-          </a:p>
-          <a:p>
-            <a:r>
-              <a:rPr lang="en-US" dirty="0"/>
-              <a:t>POST /</a:t>
-            </a:r>
-            <a:r>
-              <a:rPr lang="en-US" dirty="0" err="1"/>
-              <a:t>api</a:t>
-            </a:r>
-            <a:r>
-              <a:rPr lang="en-US" dirty="0"/>
-              <a:t>/briefings</a:t>
-            </a:r>
-          </a:p>
-          <a:p>
-            <a:r>
-              <a:rPr lang="en-US" dirty="0"/>
-              <a:t>PUT /</a:t>
-            </a:r>
-            <a:r>
-              <a:rPr lang="en-US" dirty="0" err="1"/>
-              <a:t>api</a:t>
-            </a:r>
-            <a:r>
-              <a:rPr lang="en-US" dirty="0"/>
-              <a:t>/briefings/{id}</a:t>
-            </a:r>
-          </a:p>
-          <a:p>
-            <a:r>
-              <a:rPr lang="en-US" dirty="0"/>
-              <a:t>DELETE /</a:t>
-            </a:r>
-            <a:r>
-              <a:rPr lang="en-US" dirty="0" err="1"/>
-              <a:t>api</a:t>
-            </a:r>
-            <a:r>
-              <a:rPr lang="en-US" dirty="0"/>
-              <a:t>/briefings/{id}</a:t>
-            </a:r>
+              <a:rPr lang="da-DK" dirty="0" err="1"/>
+              <a:t>Get</a:t>
+            </a:r>
+            <a:r>
+              <a:rPr lang="da-DK" dirty="0"/>
+              <a:t> all, </a:t>
+            </a:r>
+            <a:r>
+              <a:rPr lang="da-DK" dirty="0" err="1"/>
+              <a:t>Get</a:t>
+            </a:r>
+            <a:r>
+              <a:rPr lang="da-DK" dirty="0"/>
+              <a:t> by ID</a:t>
+            </a:r>
+          </a:p>
+          <a:p>
+            <a:r>
+              <a:rPr lang="da-DK" dirty="0"/>
+              <a:t>Post</a:t>
+            </a:r>
+          </a:p>
+          <a:p>
+            <a:r>
+              <a:rPr lang="da-DK" dirty="0"/>
+              <a:t>Put</a:t>
+            </a:r>
+          </a:p>
+          <a:p>
+            <a:r>
+              <a:rPr lang="da-DK" dirty="0"/>
+              <a:t>Delete</a:t>
+            </a:r>
+          </a:p>
+          <a:p>
+            <a:endParaRPr lang="en-US" dirty="0"/>
           </a:p>
         </p:txBody>
       </p:sp>
     </p:spTree>
     <p:extLst>
       <p:ext uri="{BB962C8B-B14F-4D97-AF65-F5344CB8AC3E}">
-        <p14:creationId xmlns:p14="http://schemas.microsoft.com/office/powerpoint/2010/main" val="633688300"/>
+        <p14:creationId xmlns:p14="http://schemas.microsoft.com/office/powerpoint/2010/main" val="1787617459"/>
       </p:ext>
     </p:extLst>
   </p:cSld>
@@ -3765,7 +3746,7 @@
           <p:cNvPr id="2" name="Title 1">
             <a:extLst>
               <a:ext uri="{FF2B5EF4-FFF2-40B4-BE49-F238E27FC236}">
-                <a16:creationId xmlns:a16="http://schemas.microsoft.com/office/drawing/2014/main" id="{488689F7-BD1A-AE1D-E1EF-5CC995BBDDF2}"/>
+                <a16:creationId xmlns:a16="http://schemas.microsoft.com/office/drawing/2014/main" id="{4D9C5160-A855-1232-4208-E4D5B2C5D3B9}"/>
               </a:ext>
             </a:extLst>
           </p:cNvPr>
@@ -3783,7 +3764,7 @@
           <a:p>
             <a:r>
               <a:rPr lang="da-DK" dirty="0"/>
-              <a:t>Content Distribution </a:t>
+              <a:t>Asset Metadata </a:t>
             </a:r>
             <a:r>
               <a:rPr lang="da-DK" dirty="0" err="1"/>
@@ -3798,7 +3779,7 @@
           <p:cNvPr id="3" name="Content Placeholder 2">
             <a:extLst>
               <a:ext uri="{FF2B5EF4-FFF2-40B4-BE49-F238E27FC236}">
-                <a16:creationId xmlns:a16="http://schemas.microsoft.com/office/drawing/2014/main" id="{E280662C-CC14-38CE-C474-157668BB0D35}"/>
+                <a16:creationId xmlns:a16="http://schemas.microsoft.com/office/drawing/2014/main" id="{4608E24B-EB1C-365C-B13A-BE3ED57BCF67}"/>
               </a:ext>
             </a:extLst>
           </p:cNvPr>
@@ -3824,13 +3805,8 @@
             </a:r>
             <a:r>
               <a:rPr lang="en-US" dirty="0"/>
-              <a:t>/</a:t>
-            </a:r>
-            <a:r>
-              <a:rPr lang="en-US" dirty="0" err="1"/>
-              <a:t>contentdistributions</a:t>
-            </a:r>
-            <a:endParaRPr lang="en-US" dirty="0"/>
+              <a:t>/assets</a:t>
+            </a:r>
           </a:p>
           <a:p>
             <a:r>
@@ -3843,15 +3819,7 @@
             </a:r>
             <a:r>
               <a:rPr lang="en-US" dirty="0"/>
-              <a:t>/</a:t>
-            </a:r>
-            <a:r>
-              <a:rPr lang="en-US" dirty="0" err="1"/>
-              <a:t>contentdistributions</a:t>
-            </a:r>
-            <a:r>
-              <a:rPr lang="en-US" dirty="0"/>
-              <a:t>/{id}</a:t>
+              <a:t>/assets/{id}</a:t>
             </a:r>
           </a:p>
           <a:p>
@@ -3865,13 +3833,8 @@
             </a:r>
             <a:r>
               <a:rPr lang="en-US" dirty="0"/>
-              <a:t>/</a:t>
-            </a:r>
-            <a:r>
-              <a:rPr lang="en-US" dirty="0" err="1"/>
-              <a:t>contentdistributions</a:t>
-            </a:r>
-            <a:endParaRPr lang="en-US" dirty="0"/>
+              <a:t>/assets</a:t>
+            </a:r>
           </a:p>
           <a:p>
             <a:r>
@@ -3884,15 +3847,7 @@
             </a:r>
             <a:r>
               <a:rPr lang="en-US" dirty="0"/>
-              <a:t>/</a:t>
-            </a:r>
-            <a:r>
-              <a:rPr lang="en-US" dirty="0" err="1"/>
-              <a:t>contentdistributions</a:t>
-            </a:r>
-            <a:r>
-              <a:rPr lang="en-US" dirty="0"/>
-              <a:t>/{id}</a:t>
+              <a:t>/assets/{id}</a:t>
             </a:r>
           </a:p>
           <a:p>
@@ -3906,15 +3861,7 @@
             </a:r>
             <a:r>
               <a:rPr lang="en-US" dirty="0"/>
-              <a:t>/</a:t>
-            </a:r>
-            <a:r>
-              <a:rPr lang="en-US" dirty="0" err="1"/>
-              <a:t>contentdistributions</a:t>
-            </a:r>
-            <a:r>
-              <a:rPr lang="en-US" dirty="0"/>
-              <a:t>/{id}</a:t>
+              <a:t>/assets/{id}</a:t>
             </a:r>
           </a:p>
         </p:txBody>
@@ -3922,7 +3869,7 @@
     </p:spTree>
     <p:extLst>
       <p:ext uri="{BB962C8B-B14F-4D97-AF65-F5344CB8AC3E}">
-        <p14:creationId xmlns:p14="http://schemas.microsoft.com/office/powerpoint/2010/main" val="1296579678"/>
+        <p14:creationId xmlns:p14="http://schemas.microsoft.com/office/powerpoint/2010/main" val="3495572024"/>
       </p:ext>
     </p:extLst>
   </p:cSld>
@@ -3954,7 +3901,7 @@
           <p:cNvPr id="2" name="Title 1">
             <a:extLst>
               <a:ext uri="{FF2B5EF4-FFF2-40B4-BE49-F238E27FC236}">
-                <a16:creationId xmlns:a16="http://schemas.microsoft.com/office/drawing/2014/main" id="{B7249B7F-1E50-0EC6-BC30-758241B9B049}"/>
+                <a16:creationId xmlns:a16="http://schemas.microsoft.com/office/drawing/2014/main" id="{868E5AE8-1844-E2EF-A928-51E488917DE3}"/>
               </a:ext>
             </a:extLst>
           </p:cNvPr>
@@ -3972,7 +3919,11 @@
           <a:p>
             <a:r>
               <a:rPr lang="da-DK" dirty="0"/>
-              <a:t>Technology</a:t>
+              <a:t>Briefing </a:t>
+            </a:r>
+            <a:r>
+              <a:rPr lang="da-DK" dirty="0" err="1"/>
+              <a:t>Endpoint</a:t>
             </a:r>
             <a:endParaRPr lang="en-US" dirty="0"/>
           </a:p>
@@ -3983,7 +3934,7 @@
           <p:cNvPr id="3" name="Content Placeholder 2">
             <a:extLst>
               <a:ext uri="{FF2B5EF4-FFF2-40B4-BE49-F238E27FC236}">
-                <a16:creationId xmlns:a16="http://schemas.microsoft.com/office/drawing/2014/main" id="{92B3F3E2-C88B-22D2-52CB-833B8347D1B0}"/>
+                <a16:creationId xmlns:a16="http://schemas.microsoft.com/office/drawing/2014/main" id="{24CBE445-2CF6-E54D-2642-47998DC1635D}"/>
               </a:ext>
             </a:extLst>
           </p:cNvPr>
@@ -4000,83 +3951,80 @@
           <a:lstStyle/>
           <a:p>
             <a:r>
-              <a:rPr lang="da-DK" dirty="0" err="1"/>
-              <a:t>Backend</a:t>
-            </a:r>
-            <a:r>
-              <a:rPr lang="da-DK" dirty="0"/>
-              <a:t>: ASP.NET core </a:t>
-            </a:r>
-            <a:r>
-              <a:rPr lang="da-DK" dirty="0" err="1"/>
-              <a:t>webAPI</a:t>
-            </a:r>
-            <a:endParaRPr lang="da-DK" dirty="0"/>
-          </a:p>
-          <a:p>
-            <a:r>
-              <a:rPr lang="da-DK" dirty="0"/>
-              <a:t>Database: In </a:t>
-            </a:r>
-            <a:r>
-              <a:rPr lang="da-DK" dirty="0" err="1"/>
-              <a:t>momory</a:t>
-            </a:r>
-            <a:r>
-              <a:rPr lang="da-DK" dirty="0"/>
-              <a:t> database, EF</a:t>
-            </a:r>
-          </a:p>
-          <a:p>
-            <a:r>
-              <a:rPr lang="da-DK" dirty="0"/>
-              <a:t>Authentication: JWT</a:t>
-            </a:r>
-          </a:p>
-          <a:p>
-            <a:r>
-              <a:rPr lang="da-DK" dirty="0"/>
-              <a:t>Test: </a:t>
-            </a:r>
-            <a:r>
-              <a:rPr lang="da-DK" dirty="0" err="1"/>
-              <a:t>Nunit</a:t>
-            </a:r>
-            <a:r>
-              <a:rPr lang="da-DK" dirty="0"/>
-              <a:t>, </a:t>
-            </a:r>
-            <a:r>
-              <a:rPr lang="da-DK" dirty="0" err="1"/>
-              <a:t>Moq</a:t>
-            </a:r>
-            <a:r>
-              <a:rPr lang="da-DK" dirty="0"/>
-              <a:t>, </a:t>
-            </a:r>
-            <a:r>
-              <a:rPr lang="da-DK" dirty="0" err="1"/>
-              <a:t>FluentValidation</a:t>
-            </a:r>
-            <a:endParaRPr lang="da-DK" dirty="0"/>
-          </a:p>
-          <a:p>
-            <a:r>
-              <a:rPr lang="da-DK" dirty="0"/>
-              <a:t>Tool: VS, </a:t>
-            </a:r>
-            <a:r>
-              <a:rPr lang="da-DK" dirty="0" err="1"/>
-              <a:t>Postman</a:t>
-            </a:r>
-            <a:endParaRPr lang="en-US" dirty="0"/>
+              <a:rPr lang="en-US" dirty="0"/>
+              <a:t>GET /</a:t>
+            </a:r>
+            <a:r>
+              <a:rPr lang="en-US" dirty="0" err="1"/>
+              <a:t>api</a:t>
+            </a:r>
+            <a:r>
+              <a:rPr lang="en-US" dirty="0"/>
+              <a:t>/briefings</a:t>
+            </a:r>
+          </a:p>
+          <a:p>
+            <a:r>
+              <a:rPr lang="en-US" dirty="0"/>
+              <a:t>GET /</a:t>
+            </a:r>
+            <a:r>
+              <a:rPr lang="en-US" dirty="0" err="1"/>
+              <a:t>api</a:t>
+            </a:r>
+            <a:r>
+              <a:rPr lang="en-US" dirty="0"/>
+              <a:t>/briefings/{id}</a:t>
+            </a:r>
+          </a:p>
+          <a:p>
+            <a:r>
+              <a:rPr lang="en-US" dirty="0"/>
+              <a:t>POST /</a:t>
+            </a:r>
+            <a:r>
+              <a:rPr lang="en-US" dirty="0" err="1"/>
+              <a:t>api</a:t>
+            </a:r>
+            <a:r>
+              <a:rPr lang="en-US" dirty="0"/>
+              <a:t>/briefings</a:t>
+            </a:r>
+          </a:p>
+          <a:p>
+            <a:r>
+              <a:rPr lang="en-US" dirty="0"/>
+              <a:t>PUT /</a:t>
+            </a:r>
+            <a:r>
+              <a:rPr lang="en-US" dirty="0" err="1"/>
+              <a:t>api</a:t>
+            </a:r>
+            <a:r>
+              <a:rPr lang="en-US" dirty="0"/>
+              <a:t>/briefings/{id}</a:t>
+            </a:r>
+          </a:p>
+          <a:p>
+            <a:r>
+              <a:rPr lang="en-US" dirty="0"/>
+              <a:t>DELETE /</a:t>
+            </a:r>
+            <a:r>
+              <a:rPr lang="en-US" dirty="0" err="1"/>
+              <a:t>api</a:t>
+            </a:r>
+            <a:r>
+              <a:rPr lang="en-US" dirty="0"/>
+              <a:t>/briefings/{id}</a:t>
+            </a:r>
           </a:p>
         </p:txBody>
       </p:sp>
     </p:spTree>
     <p:extLst>
       <p:ext uri="{BB962C8B-B14F-4D97-AF65-F5344CB8AC3E}">
-        <p14:creationId xmlns:p14="http://schemas.microsoft.com/office/powerpoint/2010/main" val="1540710725"/>
+        <p14:creationId xmlns:p14="http://schemas.microsoft.com/office/powerpoint/2010/main" val="633688300"/>
       </p:ext>
     </p:extLst>
   </p:cSld>
@@ -4108,7 +4056,7 @@
           <p:cNvPr id="2" name="Title 1">
             <a:extLst>
               <a:ext uri="{FF2B5EF4-FFF2-40B4-BE49-F238E27FC236}">
-                <a16:creationId xmlns:a16="http://schemas.microsoft.com/office/drawing/2014/main" id="{535953F8-20BC-F9E3-0BC4-34C163F762DF}"/>
+                <a16:creationId xmlns:a16="http://schemas.microsoft.com/office/drawing/2014/main" id="{488689F7-BD1A-AE1D-E1EF-5CC995BBDDF2}"/>
               </a:ext>
             </a:extLst>
           </p:cNvPr>
@@ -4126,7 +4074,11 @@
           <a:p>
             <a:r>
               <a:rPr lang="da-DK" dirty="0"/>
-              <a:t>Test</a:t>
+              <a:t>Content Distribution </a:t>
+            </a:r>
+            <a:r>
+              <a:rPr lang="da-DK" dirty="0" err="1"/>
+              <a:t>Endpoint</a:t>
             </a:r>
             <a:endParaRPr lang="en-US" dirty="0"/>
           </a:p>
@@ -4137,7 +4089,7 @@
           <p:cNvPr id="3" name="Content Placeholder 2">
             <a:extLst>
               <a:ext uri="{FF2B5EF4-FFF2-40B4-BE49-F238E27FC236}">
-                <a16:creationId xmlns:a16="http://schemas.microsoft.com/office/drawing/2014/main" id="{A954F9CD-DDB3-2482-ACBB-D72C1FF83088}"/>
+                <a16:creationId xmlns:a16="http://schemas.microsoft.com/office/drawing/2014/main" id="{E280662C-CC14-38CE-C474-157668BB0D35}"/>
               </a:ext>
             </a:extLst>
           </p:cNvPr>
@@ -4154,51 +4106,114 @@
           <a:lstStyle/>
           <a:p>
             <a:r>
-              <a:rPr lang="da-DK" dirty="0" err="1"/>
-              <a:t>Nunit</a:t>
-            </a:r>
-            <a:r>
-              <a:rPr lang="da-DK" dirty="0"/>
-              <a:t> and </a:t>
-            </a:r>
-            <a:r>
-              <a:rPr lang="da-DK" dirty="0" err="1"/>
-              <a:t>moq</a:t>
-            </a:r>
-            <a:endParaRPr lang="da-DK" dirty="0"/>
-          </a:p>
-          <a:p>
-            <a:r>
-              <a:rPr lang="da-DK" dirty="0"/>
-              <a:t>Controllers, services, </a:t>
-            </a:r>
-            <a:r>
-              <a:rPr lang="da-DK" dirty="0" err="1"/>
-              <a:t>validators</a:t>
-            </a:r>
-            <a:r>
-              <a:rPr lang="da-DK" dirty="0"/>
-              <a:t>, </a:t>
-            </a:r>
-            <a:r>
-              <a:rPr lang="da-DK" dirty="0" err="1"/>
-              <a:t>repostories</a:t>
-            </a:r>
-            <a:endParaRPr lang="da-DK" dirty="0"/>
-          </a:p>
-          <a:p>
-            <a:r>
-              <a:rPr lang="da-DK" dirty="0"/>
-              <a:t>All scenario</a:t>
+              <a:rPr lang="en-US" dirty="0"/>
+              <a:t>GET /</a:t>
+            </a:r>
+            <a:r>
+              <a:rPr lang="en-US" dirty="0" err="1"/>
+              <a:t>api</a:t>
+            </a:r>
+            <a:r>
+              <a:rPr lang="en-US" dirty="0"/>
+              <a:t>/</a:t>
+            </a:r>
+            <a:r>
+              <a:rPr lang="en-US" dirty="0" err="1"/>
+              <a:t>contentdistributions</a:t>
             </a:r>
             <a:endParaRPr lang="en-US" dirty="0"/>
+          </a:p>
+          <a:p>
+            <a:r>
+              <a:rPr lang="en-US" dirty="0"/>
+              <a:t>GET /</a:t>
+            </a:r>
+            <a:r>
+              <a:rPr lang="en-US" dirty="0" err="1"/>
+              <a:t>api</a:t>
+            </a:r>
+            <a:r>
+              <a:rPr lang="en-US" dirty="0"/>
+              <a:t>/</a:t>
+            </a:r>
+            <a:r>
+              <a:rPr lang="en-US" dirty="0" err="1"/>
+              <a:t>contentdistributions</a:t>
+            </a:r>
+            <a:r>
+              <a:rPr lang="en-US" dirty="0"/>
+              <a:t>/{id}</a:t>
+            </a:r>
+          </a:p>
+          <a:p>
+            <a:r>
+              <a:rPr lang="en-US" dirty="0"/>
+              <a:t>POST /</a:t>
+            </a:r>
+            <a:r>
+              <a:rPr lang="en-US" dirty="0" err="1"/>
+              <a:t>api</a:t>
+            </a:r>
+            <a:r>
+              <a:rPr lang="en-US" dirty="0"/>
+              <a:t>/</a:t>
+            </a:r>
+            <a:r>
+              <a:rPr lang="en-US" dirty="0" err="1"/>
+              <a:t>contentdistributions</a:t>
+            </a:r>
+            <a:endParaRPr lang="en-US" dirty="0"/>
+          </a:p>
+          <a:p>
+            <a:r>
+              <a:rPr lang="en-US" dirty="0"/>
+              <a:t>PUT /</a:t>
+            </a:r>
+            <a:r>
+              <a:rPr lang="en-US" dirty="0" err="1"/>
+              <a:t>api</a:t>
+            </a:r>
+            <a:r>
+              <a:rPr lang="en-US" dirty="0"/>
+              <a:t>/</a:t>
+            </a:r>
+            <a:r>
+              <a:rPr lang="en-US" dirty="0" err="1"/>
+              <a:t>contentdistributions</a:t>
+            </a:r>
+            <a:r>
+              <a:rPr lang="en-US" dirty="0"/>
+              <a:t>/{id}</a:t>
+            </a:r>
+          </a:p>
+          <a:p>
+            <a:r>
+              <a:rPr lang="en-US" dirty="0"/>
+              <a:t>DELETE /</a:t>
+            </a:r>
+            <a:r>
+              <a:rPr lang="en-US" dirty="0" err="1"/>
+              <a:t>api</a:t>
+            </a:r>
+            <a:r>
+              <a:rPr lang="en-US" dirty="0"/>
+              <a:t>/</a:t>
+            </a:r>
+            <a:r>
+              <a:rPr lang="en-US" dirty="0" err="1"/>
+              <a:t>contentdistributions</a:t>
+            </a:r>
+            <a:r>
+              <a:rPr lang="en-US" dirty="0"/>
+              <a:t>/{id}</a:t>
+            </a:r>
           </a:p>
         </p:txBody>
       </p:sp>
     </p:spTree>
     <p:extLst>
       <p:ext uri="{BB962C8B-B14F-4D97-AF65-F5344CB8AC3E}">
-        <p14:creationId xmlns:p14="http://schemas.microsoft.com/office/powerpoint/2010/main" val="253268459"/>
+        <p14:creationId xmlns:p14="http://schemas.microsoft.com/office/powerpoint/2010/main" val="1296579678"/>
       </p:ext>
     </p:extLst>
   </p:cSld>
@@ -4230,7 +4245,7 @@
           <p:cNvPr id="2" name="Title 1">
             <a:extLst>
               <a:ext uri="{FF2B5EF4-FFF2-40B4-BE49-F238E27FC236}">
-                <a16:creationId xmlns:a16="http://schemas.microsoft.com/office/drawing/2014/main" id="{89597F6A-4939-547B-1C03-67D88DCAAD38}"/>
+                <a16:creationId xmlns:a16="http://schemas.microsoft.com/office/drawing/2014/main" id="{535953F8-20BC-F9E3-0BC4-34C163F762DF}"/>
               </a:ext>
             </a:extLst>
           </p:cNvPr>
@@ -4247,12 +4262,8 @@
           <a:lstStyle/>
           <a:p>
             <a:r>
-              <a:rPr lang="da-DK" dirty="0" err="1"/>
-              <a:t>Chanllenges</a:t>
-            </a:r>
-            <a:r>
-              <a:rPr lang="da-DK" dirty="0"/>
-              <a:t> and Solutions</a:t>
+              <a:rPr lang="da-DK" dirty="0"/>
+              <a:t>Test</a:t>
             </a:r>
             <a:endParaRPr lang="en-US" dirty="0"/>
           </a:p>
@@ -4263,7 +4274,7 @@
           <p:cNvPr id="3" name="Content Placeholder 2">
             <a:extLst>
               <a:ext uri="{FF2B5EF4-FFF2-40B4-BE49-F238E27FC236}">
-                <a16:creationId xmlns:a16="http://schemas.microsoft.com/office/drawing/2014/main" id="{1CF17BE3-4097-DB80-E82A-AFDBDA84A548}"/>
+                <a16:creationId xmlns:a16="http://schemas.microsoft.com/office/drawing/2014/main" id="{A954F9CD-DDB3-2482-ACBB-D72C1FF83088}"/>
               </a:ext>
             </a:extLst>
           </p:cNvPr>
@@ -4281,175 +4292,42 @@
           <a:p>
             <a:r>
               <a:rPr lang="da-DK" dirty="0" err="1"/>
-              <a:t>InvalidOperation</a:t>
-            </a:r>
-            <a:r>
-              <a:rPr lang="da-DK" dirty="0"/>
-              <a:t> </a:t>
-            </a:r>
-            <a:r>
-              <a:rPr lang="da-DK" dirty="0" err="1"/>
-              <a:t>Exception</a:t>
-            </a:r>
-            <a:r>
-              <a:rPr lang="da-DK" dirty="0"/>
-              <a:t> due to </a:t>
-            </a:r>
-            <a:r>
-              <a:rPr lang="da-DK" dirty="0" err="1"/>
-              <a:t>unregistered</a:t>
-            </a:r>
-            <a:r>
-              <a:rPr lang="da-DK" dirty="0"/>
-              <a:t> services</a:t>
-            </a:r>
-          </a:p>
-          <a:p>
-            <a:r>
-              <a:rPr lang="da-DK" dirty="0" err="1"/>
-              <a:t>Azure</a:t>
-            </a:r>
-            <a:r>
-              <a:rPr lang="da-DK" dirty="0"/>
-              <a:t> Sql firewall, </a:t>
-            </a:r>
-            <a:r>
-              <a:rPr lang="da-DK" dirty="0" err="1"/>
-              <a:t>local</a:t>
-            </a:r>
-            <a:r>
-              <a:rPr lang="da-DK" dirty="0"/>
-              <a:t> Sql database with </a:t>
-            </a:r>
-            <a:r>
-              <a:rPr lang="da-DK" dirty="0" err="1"/>
-              <a:t>containerition</a:t>
+              <a:t>Nunit</a:t>
+            </a:r>
+            <a:r>
+              <a:rPr lang="da-DK" dirty="0"/>
+              <a:t> and </a:t>
+            </a:r>
+            <a:r>
+              <a:rPr lang="da-DK" dirty="0" err="1"/>
+              <a:t>moq</a:t>
             </a:r>
             <a:endParaRPr lang="da-DK" dirty="0"/>
           </a:p>
           <a:p>
             <a:r>
-              <a:rPr lang="da-DK" dirty="0" err="1"/>
-              <a:t>System.text.json</a:t>
-            </a:r>
-            <a:r>
-              <a:rPr lang="da-DK" dirty="0"/>
-              <a:t> </a:t>
-            </a:r>
-            <a:r>
-              <a:rPr lang="da-DK" dirty="0" err="1"/>
-              <a:t>json</a:t>
-            </a:r>
-            <a:r>
-              <a:rPr lang="da-DK" dirty="0"/>
-              <a:t> </a:t>
-            </a:r>
-            <a:r>
-              <a:rPr lang="da-DK" dirty="0" err="1"/>
-              <a:t>exception</a:t>
-            </a:r>
-            <a:r>
-              <a:rPr lang="da-DK" dirty="0"/>
-              <a:t> due to </a:t>
-            </a:r>
-            <a:r>
-              <a:rPr lang="da-DK" dirty="0" err="1"/>
-              <a:t>cyclic</a:t>
-            </a:r>
-            <a:r>
-              <a:rPr lang="da-DK" dirty="0"/>
-              <a:t> references, Solution: </a:t>
-            </a:r>
-            <a:r>
-              <a:rPr lang="en-US" sz="1600" dirty="0" err="1">
-                <a:solidFill>
-                  <a:srgbClr val="000000"/>
-                </a:solidFill>
-                <a:latin typeface="Cascadia Mono" panose="020B0609020000020004" pitchFamily="49" charset="0"/>
-              </a:rPr>
-              <a:t>AddJsonOptions</a:t>
-            </a:r>
-            <a:r>
-              <a:rPr lang="en-US" sz="1600" dirty="0">
-                <a:solidFill>
-                  <a:srgbClr val="000000"/>
-                </a:solidFill>
-                <a:latin typeface="Cascadia Mono" panose="020B0609020000020004" pitchFamily="49" charset="0"/>
-              </a:rPr>
-              <a:t>(x =&gt;</a:t>
-            </a:r>
-            <a:r>
-              <a:rPr lang="en-US" sz="1600" dirty="0" err="1">
-                <a:solidFill>
-                  <a:srgbClr val="000000"/>
-                </a:solidFill>
-                <a:latin typeface="Cascadia Mono" panose="020B0609020000020004" pitchFamily="49" charset="0"/>
-              </a:rPr>
-              <a:t>x.JsonSerializerOptions.ReferenceHandler</a:t>
-            </a:r>
-            <a:r>
-              <a:rPr lang="en-US" sz="1600" dirty="0">
-                <a:solidFill>
-                  <a:srgbClr val="000000"/>
-                </a:solidFill>
-                <a:latin typeface="Cascadia Mono" panose="020B0609020000020004" pitchFamily="49" charset="0"/>
-              </a:rPr>
-              <a:t> = 			</a:t>
-            </a:r>
-            <a:r>
-              <a:rPr lang="en-US" sz="1600" dirty="0" err="1">
-                <a:solidFill>
-                  <a:srgbClr val="000000"/>
-                </a:solidFill>
-                <a:latin typeface="Cascadia Mono" panose="020B0609020000020004" pitchFamily="49" charset="0"/>
-              </a:rPr>
-              <a:t>ReferenceHandler.Preserve</a:t>
-            </a:r>
-            <a:r>
-              <a:rPr lang="en-US" sz="1600" dirty="0">
-                <a:solidFill>
-                  <a:srgbClr val="000000"/>
-                </a:solidFill>
-                <a:latin typeface="Cascadia Mono" panose="020B0609020000020004" pitchFamily="49" charset="0"/>
-              </a:rPr>
-              <a:t>);  or data annotation with Json ignore</a:t>
-            </a:r>
-            <a:endParaRPr lang="da-DK" sz="1600" dirty="0"/>
-          </a:p>
-          <a:p>
+              <a:rPr lang="da-DK" dirty="0"/>
+              <a:t>Controllers, services, </a:t>
+            </a:r>
+            <a:r>
+              <a:rPr lang="da-DK" dirty="0" err="1"/>
+              <a:t>validators</a:t>
+            </a:r>
+            <a:r>
+              <a:rPr lang="da-DK" dirty="0"/>
+              <a:t>, </a:t>
+            </a:r>
+            <a:r>
+              <a:rPr lang="da-DK" dirty="0" err="1"/>
+              <a:t>repostories</a:t>
+            </a:r>
             <a:endParaRPr lang="da-DK" dirty="0"/>
           </a:p>
           <a:p>
-            <a:pPr marL="0" indent="0">
-              <a:buNone/>
-            </a:pPr>
-            <a:br>
-              <a:rPr lang="en-US" sz="1800" dirty="0">
-                <a:solidFill>
-                  <a:srgbClr val="000000"/>
-                </a:solidFill>
-                <a:latin typeface="Cascadia Mono" panose="020B0609020000020004" pitchFamily="49" charset="0"/>
-              </a:rPr>
-            </a:br>
-            <a:br>
-              <a:rPr lang="en-US" sz="1800" dirty="0">
-                <a:solidFill>
-                  <a:srgbClr val="000000"/>
-                </a:solidFill>
-                <a:latin typeface="Cascadia Mono" panose="020B0609020000020004" pitchFamily="49" charset="0"/>
-              </a:rPr>
-            </a:br>
-            <a:r>
-              <a:rPr lang="en-US" sz="1800" dirty="0">
-                <a:solidFill>
-                  <a:srgbClr val="000000"/>
-                </a:solidFill>
-                <a:latin typeface="Cascadia Mono" panose="020B0609020000020004" pitchFamily="49" charset="0"/>
-              </a:rPr>
-              <a:t>    </a:t>
-            </a:r>
-          </a:p>
-          <a:p>
+            <a:r>
+              <a:rPr lang="da-DK" dirty="0"/>
+              <a:t>All scenario</a:t>
+            </a:r>
             <a:endParaRPr lang="en-US" dirty="0"/>
           </a:p>
         </p:txBody>
@@ -4457,7 +4335,7 @@
     </p:spTree>
     <p:extLst>
       <p:ext uri="{BB962C8B-B14F-4D97-AF65-F5344CB8AC3E}">
-        <p14:creationId xmlns:p14="http://schemas.microsoft.com/office/powerpoint/2010/main" val="522071778"/>
+        <p14:creationId xmlns:p14="http://schemas.microsoft.com/office/powerpoint/2010/main" val="253268459"/>
       </p:ext>
     </p:extLst>
   </p:cSld>
@@ -4489,6 +4367,294 @@
           <p:cNvPr id="2" name="Title 1">
             <a:extLst>
               <a:ext uri="{FF2B5EF4-FFF2-40B4-BE49-F238E27FC236}">
+                <a16:creationId xmlns:a16="http://schemas.microsoft.com/office/drawing/2014/main" id="{89597F6A-4939-547B-1C03-67D88DCAAD38}"/>
+              </a:ext>
+            </a:extLst>
+          </p:cNvPr>
+          <p:cNvSpPr>
+            <a:spLocks noGrp="1"/>
+          </p:cNvSpPr>
+          <p:nvPr>
+            <p:ph type="title"/>
+          </p:nvPr>
+        </p:nvSpPr>
+        <p:spPr/>
+        <p:txBody>
+          <a:bodyPr/>
+          <a:lstStyle/>
+          <a:p>
+            <a:r>
+              <a:rPr lang="da-DK" dirty="0" err="1"/>
+              <a:t>Chanllenges</a:t>
+            </a:r>
+            <a:r>
+              <a:rPr lang="da-DK" dirty="0"/>
+              <a:t> and Solutions</a:t>
+            </a:r>
+            <a:endParaRPr lang="en-US" dirty="0"/>
+          </a:p>
+        </p:txBody>
+      </p:sp>
+      <p:sp>
+        <p:nvSpPr>
+          <p:cNvPr id="3" name="Content Placeholder 2">
+            <a:extLst>
+              <a:ext uri="{FF2B5EF4-FFF2-40B4-BE49-F238E27FC236}">
+                <a16:creationId xmlns:a16="http://schemas.microsoft.com/office/drawing/2014/main" id="{1CF17BE3-4097-DB80-E82A-AFDBDA84A548}"/>
+              </a:ext>
+            </a:extLst>
+          </p:cNvPr>
+          <p:cNvSpPr>
+            <a:spLocks noGrp="1"/>
+          </p:cNvSpPr>
+          <p:nvPr>
+            <p:ph idx="1"/>
+          </p:nvPr>
+        </p:nvSpPr>
+        <p:spPr/>
+        <p:txBody>
+          <a:bodyPr/>
+          <a:lstStyle/>
+          <a:p>
+            <a:r>
+              <a:rPr lang="da-DK" dirty="0" err="1"/>
+              <a:t>InvalidOperation</a:t>
+            </a:r>
+            <a:r>
+              <a:rPr lang="da-DK" dirty="0"/>
+              <a:t> </a:t>
+            </a:r>
+            <a:r>
+              <a:rPr lang="da-DK" dirty="0" err="1"/>
+              <a:t>Exception</a:t>
+            </a:r>
+            <a:r>
+              <a:rPr lang="da-DK" dirty="0"/>
+              <a:t> due to </a:t>
+            </a:r>
+            <a:r>
+              <a:rPr lang="da-DK" dirty="0" err="1"/>
+              <a:t>unregistered</a:t>
+            </a:r>
+            <a:r>
+              <a:rPr lang="da-DK" dirty="0"/>
+              <a:t> services</a:t>
+            </a:r>
+          </a:p>
+          <a:p>
+            <a:r>
+              <a:rPr lang="da-DK" dirty="0" err="1"/>
+              <a:t>Azure</a:t>
+            </a:r>
+            <a:r>
+              <a:rPr lang="da-DK" dirty="0"/>
+              <a:t> Sql firewall, </a:t>
+            </a:r>
+            <a:r>
+              <a:rPr lang="da-DK" dirty="0" err="1"/>
+              <a:t>local</a:t>
+            </a:r>
+            <a:r>
+              <a:rPr lang="da-DK" dirty="0"/>
+              <a:t> Sql database with </a:t>
+            </a:r>
+            <a:r>
+              <a:rPr lang="da-DK" dirty="0" err="1"/>
+              <a:t>containerization</a:t>
+            </a:r>
+            <a:endParaRPr lang="da-DK" dirty="0"/>
+          </a:p>
+          <a:p>
+            <a:r>
+              <a:rPr lang="da-DK" dirty="0"/>
+              <a:t>Data </a:t>
+            </a:r>
+            <a:r>
+              <a:rPr lang="da-DK" dirty="0" err="1"/>
+              <a:t>validation</a:t>
+            </a:r>
+            <a:r>
+              <a:rPr lang="da-DK" dirty="0"/>
+              <a:t> </a:t>
+            </a:r>
+            <a:r>
+              <a:rPr lang="da-DK" dirty="0" err="1"/>
+              <a:t>error</a:t>
+            </a:r>
+            <a:r>
+              <a:rPr lang="da-DK" dirty="0"/>
+              <a:t> in data bing and </a:t>
+            </a:r>
+            <a:r>
+              <a:rPr lang="da-DK" dirty="0" err="1"/>
+              <a:t>validation</a:t>
+            </a:r>
+            <a:endParaRPr lang="da-DK" dirty="0"/>
+          </a:p>
+          <a:p>
+            <a:r>
+              <a:rPr lang="da-DK" dirty="0" err="1"/>
+              <a:t>System.text.json</a:t>
+            </a:r>
+            <a:r>
+              <a:rPr lang="da-DK" dirty="0"/>
+              <a:t> </a:t>
+            </a:r>
+            <a:r>
+              <a:rPr lang="da-DK" dirty="0" err="1"/>
+              <a:t>json</a:t>
+            </a:r>
+            <a:r>
+              <a:rPr lang="da-DK" dirty="0"/>
+              <a:t> </a:t>
+            </a:r>
+            <a:r>
+              <a:rPr lang="da-DK" dirty="0" err="1"/>
+              <a:t>exception</a:t>
+            </a:r>
+            <a:r>
+              <a:rPr lang="da-DK" dirty="0"/>
+              <a:t> due to </a:t>
+            </a:r>
+            <a:r>
+              <a:rPr lang="da-DK" dirty="0" err="1"/>
+              <a:t>cyclic</a:t>
+            </a:r>
+            <a:r>
+              <a:rPr lang="da-DK" dirty="0"/>
+              <a:t> references, Solution: </a:t>
+            </a:r>
+            <a:r>
+              <a:rPr lang="en-US" sz="1600" dirty="0" err="1">
+                <a:solidFill>
+                  <a:srgbClr val="000000"/>
+                </a:solidFill>
+                <a:latin typeface="Cascadia Mono" panose="020B0609020000020004" pitchFamily="49" charset="0"/>
+              </a:rPr>
+              <a:t>AddJsonOptions</a:t>
+            </a:r>
+            <a:r>
+              <a:rPr lang="en-US" sz="1600" dirty="0">
+                <a:solidFill>
+                  <a:srgbClr val="000000"/>
+                </a:solidFill>
+                <a:latin typeface="Cascadia Mono" panose="020B0609020000020004" pitchFamily="49" charset="0"/>
+              </a:rPr>
+              <a:t>(x =&gt;</a:t>
+            </a:r>
+            <a:r>
+              <a:rPr lang="en-US" sz="1600" dirty="0" err="1">
+                <a:solidFill>
+                  <a:srgbClr val="000000"/>
+                </a:solidFill>
+                <a:latin typeface="Cascadia Mono" panose="020B0609020000020004" pitchFamily="49" charset="0"/>
+              </a:rPr>
+              <a:t>x.JsonSerializerOptions.ReferenceHandler</a:t>
+            </a:r>
+            <a:r>
+              <a:rPr lang="en-US" sz="1600" dirty="0">
+                <a:solidFill>
+                  <a:srgbClr val="000000"/>
+                </a:solidFill>
+                <a:latin typeface="Cascadia Mono" panose="020B0609020000020004" pitchFamily="49" charset="0"/>
+              </a:rPr>
+              <a:t> = 			</a:t>
+            </a:r>
+            <a:r>
+              <a:rPr lang="en-US" sz="1600" dirty="0" err="1">
+                <a:solidFill>
+                  <a:srgbClr val="000000"/>
+                </a:solidFill>
+                <a:latin typeface="Cascadia Mono" panose="020B0609020000020004" pitchFamily="49" charset="0"/>
+              </a:rPr>
+              <a:t>ReferenceHandler.Preserve</a:t>
+            </a:r>
+            <a:r>
+              <a:rPr lang="en-US" sz="1600" dirty="0">
+                <a:solidFill>
+                  <a:srgbClr val="000000"/>
+                </a:solidFill>
+                <a:latin typeface="Cascadia Mono" panose="020B0609020000020004" pitchFamily="49" charset="0"/>
+              </a:rPr>
+              <a:t>);  or data annotation with Json ignore</a:t>
+            </a:r>
+          </a:p>
+          <a:p>
+            <a:endParaRPr lang="da-DK" sz="1600" dirty="0"/>
+          </a:p>
+          <a:p>
+            <a:endParaRPr lang="da-DK" dirty="0"/>
+          </a:p>
+          <a:p>
+            <a:pPr marL="0" indent="0">
+              <a:buNone/>
+            </a:pPr>
+            <a:br>
+              <a:rPr lang="en-US" sz="1800" dirty="0">
+                <a:solidFill>
+                  <a:srgbClr val="000000"/>
+                </a:solidFill>
+                <a:latin typeface="Cascadia Mono" panose="020B0609020000020004" pitchFamily="49" charset="0"/>
+              </a:rPr>
+            </a:br>
+            <a:br>
+              <a:rPr lang="en-US" sz="1800" dirty="0">
+                <a:solidFill>
+                  <a:srgbClr val="000000"/>
+                </a:solidFill>
+                <a:latin typeface="Cascadia Mono" panose="020B0609020000020004" pitchFamily="49" charset="0"/>
+              </a:rPr>
+            </a:br>
+            <a:r>
+              <a:rPr lang="en-US" sz="1800" dirty="0">
+                <a:solidFill>
+                  <a:srgbClr val="000000"/>
+                </a:solidFill>
+                <a:latin typeface="Cascadia Mono" panose="020B0609020000020004" pitchFamily="49" charset="0"/>
+              </a:rPr>
+              <a:t>    </a:t>
+            </a:r>
+          </a:p>
+          <a:p>
+            <a:endParaRPr lang="en-US" dirty="0"/>
+          </a:p>
+        </p:txBody>
+      </p:sp>
+    </p:spTree>
+    <p:extLst>
+      <p:ext uri="{BB962C8B-B14F-4D97-AF65-F5344CB8AC3E}">
+        <p14:creationId xmlns:p14="http://schemas.microsoft.com/office/powerpoint/2010/main" val="522071778"/>
+      </p:ext>
+    </p:extLst>
+  </p:cSld>
+  <p:clrMapOvr>
+    <a:masterClrMapping/>
+  </p:clrMapOvr>
+</p:sld>
+</file>
+
+<file path=ppt/slides/slide17.xml><?xml version="1.0" encoding="utf-8"?>
+<p:sld xmlns:a="http://schemas.openxmlformats.org/drawingml/2006/main" xmlns:r="http://schemas.openxmlformats.org/officeDocument/2006/relationships" xmlns:p="http://schemas.openxmlformats.org/presentationml/2006/main">
+  <p:cSld>
+    <p:spTree>
+      <p:nvGrpSpPr>
+        <p:cNvPr id="1" name=""/>
+        <p:cNvGrpSpPr/>
+        <p:nvPr/>
+      </p:nvGrpSpPr>
+      <p:grpSpPr>
+        <a:xfrm>
+          <a:off x="0" y="0"/>
+          <a:ext cx="0" cy="0"/>
+          <a:chOff x="0" y="0"/>
+          <a:chExt cx="0" cy="0"/>
+        </a:xfrm>
+      </p:grpSpPr>
+      <p:sp>
+        <p:nvSpPr>
+          <p:cNvPr id="2" name="Title 1">
+            <a:extLst>
+              <a:ext uri="{FF2B5EF4-FFF2-40B4-BE49-F238E27FC236}">
                 <a16:creationId xmlns:a16="http://schemas.microsoft.com/office/drawing/2014/main" id="{84FC7A8B-E0C0-E7F6-54B9-3652C6B21EDA}"/>
               </a:ext>
             </a:extLst>
@@ -4631,7 +4797,7 @@
 </p:sld>
 </file>
 
-<file path=ppt/slides/slide17.xml><?xml version="1.0" encoding="utf-8"?>
+<file path=ppt/slides/slide18.xml><?xml version="1.0" encoding="utf-8"?>
 <p:sld xmlns:a="http://schemas.openxmlformats.org/drawingml/2006/main" xmlns:r="http://schemas.openxmlformats.org/officeDocument/2006/relationships" xmlns:p="http://schemas.openxmlformats.org/presentationml/2006/main">
   <p:cSld>
     <p:spTree>
@@ -4739,7 +4905,7 @@
 </p:sld>
 </file>
 
-<file path=ppt/slides/slide18.xml><?xml version="1.0" encoding="utf-8"?>
+<file path=ppt/slides/slide19.xml><?xml version="1.0" encoding="utf-8"?>
 <p:sld xmlns:a="http://schemas.openxmlformats.org/drawingml/2006/main" xmlns:r="http://schemas.openxmlformats.org/officeDocument/2006/relationships" xmlns:p="http://schemas.openxmlformats.org/presentationml/2006/main">
   <p:cSld>
     <p:spTree>
@@ -4835,7 +5001,106 @@
 </p:sld>
 </file>
 
-<file path=ppt/slides/slide19.xml><?xml version="1.0" encoding="utf-8"?>
+<file path=ppt/slides/slide2.xml><?xml version="1.0" encoding="utf-8"?>
+<p:sld xmlns:a="http://schemas.openxmlformats.org/drawingml/2006/main" xmlns:r="http://schemas.openxmlformats.org/officeDocument/2006/relationships" xmlns:p="http://schemas.openxmlformats.org/presentationml/2006/main">
+  <p:cSld>
+    <p:spTree>
+      <p:nvGrpSpPr>
+        <p:cNvPr id="1" name=""/>
+        <p:cNvGrpSpPr/>
+        <p:nvPr/>
+      </p:nvGrpSpPr>
+      <p:grpSpPr>
+        <a:xfrm>
+          <a:off x="0" y="0"/>
+          <a:ext cx="0" cy="0"/>
+          <a:chOff x="0" y="0"/>
+          <a:chExt cx="0" cy="0"/>
+        </a:xfrm>
+      </p:grpSpPr>
+      <p:sp>
+        <p:nvSpPr>
+          <p:cNvPr id="2" name="Title 1">
+            <a:extLst>
+              <a:ext uri="{FF2B5EF4-FFF2-40B4-BE49-F238E27FC236}">
+                <a16:creationId xmlns:a16="http://schemas.microsoft.com/office/drawing/2014/main" id="{56023F36-27A8-7FFB-C638-35A36A033D2E}"/>
+              </a:ext>
+            </a:extLst>
+          </p:cNvPr>
+          <p:cNvSpPr>
+            <a:spLocks noGrp="1"/>
+          </p:cNvSpPr>
+          <p:nvPr>
+            <p:ph type="title"/>
+          </p:nvPr>
+        </p:nvSpPr>
+        <p:spPr/>
+        <p:txBody>
+          <a:bodyPr/>
+          <a:lstStyle/>
+          <a:p>
+            <a:r>
+              <a:rPr lang="da-DK" dirty="0"/>
+              <a:t>Overview</a:t>
+            </a:r>
+            <a:endParaRPr lang="en-US" dirty="0"/>
+          </a:p>
+        </p:txBody>
+      </p:sp>
+      <p:sp>
+        <p:nvSpPr>
+          <p:cNvPr id="3" name="Content Placeholder 2">
+            <a:extLst>
+              <a:ext uri="{FF2B5EF4-FFF2-40B4-BE49-F238E27FC236}">
+                <a16:creationId xmlns:a16="http://schemas.microsoft.com/office/drawing/2014/main" id="{9527659D-85B0-8BDE-4FF4-C6F35839193B}"/>
+              </a:ext>
+            </a:extLst>
+          </p:cNvPr>
+          <p:cNvSpPr>
+            <a:spLocks noGrp="1"/>
+          </p:cNvSpPr>
+          <p:nvPr>
+            <p:ph idx="1"/>
+          </p:nvPr>
+        </p:nvSpPr>
+        <p:spPr/>
+        <p:txBody>
+          <a:bodyPr/>
+          <a:lstStyle/>
+          <a:p>
+            <a:r>
+              <a:rPr lang="en-US" dirty="0"/>
+              <a:t>The Solution is a set of RESTful APIs designed to manage digital assets, briefings, and content distribution metadata.</a:t>
+            </a:r>
+          </a:p>
+          <a:p>
+            <a:r>
+              <a:rPr lang="en-US" dirty="0"/>
+              <a:t>Aimed to streamline the management and distribution of multimedia assets for various channels and platforms.</a:t>
+            </a:r>
+          </a:p>
+          <a:p>
+            <a:r>
+              <a:rPr lang="en-US" dirty="0"/>
+              <a:t>Objective: scalable, maintainable, secure architecture, easy integration with other services.</a:t>
+            </a:r>
+          </a:p>
+        </p:txBody>
+      </p:sp>
+    </p:spTree>
+    <p:extLst>
+      <p:ext uri="{BB962C8B-B14F-4D97-AF65-F5344CB8AC3E}">
+        <p14:creationId xmlns:p14="http://schemas.microsoft.com/office/powerpoint/2010/main" val="855457144"/>
+      </p:ext>
+    </p:extLst>
+  </p:cSld>
+  <p:clrMapOvr>
+    <a:masterClrMapping/>
+  </p:clrMapOvr>
+</p:sld>
+</file>
+
+<file path=ppt/slides/slide20.xml><?xml version="1.0" encoding="utf-8"?>
 <p:sld xmlns:a="http://schemas.openxmlformats.org/drawingml/2006/main" xmlns:r="http://schemas.openxmlformats.org/officeDocument/2006/relationships" xmlns:p="http://schemas.openxmlformats.org/presentationml/2006/main">
   <p:cSld>
     <p:spTree>
@@ -4931,211 +5196,7 @@
 </p:sld>
 </file>
 
-<file path=ppt/slides/slide2.xml><?xml version="1.0" encoding="utf-8"?>
-<p:sld xmlns:a="http://schemas.openxmlformats.org/drawingml/2006/main" xmlns:r="http://schemas.openxmlformats.org/officeDocument/2006/relationships" xmlns:p="http://schemas.openxmlformats.org/presentationml/2006/main">
-  <p:cSld>
-    <p:spTree>
-      <p:nvGrpSpPr>
-        <p:cNvPr id="1" name=""/>
-        <p:cNvGrpSpPr/>
-        <p:nvPr/>
-      </p:nvGrpSpPr>
-      <p:grpSpPr>
-        <a:xfrm>
-          <a:off x="0" y="0"/>
-          <a:ext cx="0" cy="0"/>
-          <a:chOff x="0" y="0"/>
-          <a:chExt cx="0" cy="0"/>
-        </a:xfrm>
-      </p:grpSpPr>
-      <p:sp>
-        <p:nvSpPr>
-          <p:cNvPr id="2" name="Title 1">
-            <a:extLst>
-              <a:ext uri="{FF2B5EF4-FFF2-40B4-BE49-F238E27FC236}">
-                <a16:creationId xmlns:a16="http://schemas.microsoft.com/office/drawing/2014/main" id="{20CC4272-FB95-82B8-1736-52882955AE9F}"/>
-              </a:ext>
-            </a:extLst>
-          </p:cNvPr>
-          <p:cNvSpPr>
-            <a:spLocks noGrp="1"/>
-          </p:cNvSpPr>
-          <p:nvPr>
-            <p:ph type="title"/>
-          </p:nvPr>
-        </p:nvSpPr>
-        <p:spPr/>
-        <p:txBody>
-          <a:bodyPr/>
-          <a:lstStyle/>
-          <a:p>
-            <a:r>
-              <a:rPr lang="da-DK" dirty="0" err="1"/>
-              <a:t>Structure</a:t>
-            </a:r>
-            <a:endParaRPr lang="en-US" dirty="0"/>
-          </a:p>
-        </p:txBody>
-      </p:sp>
-      <p:sp>
-        <p:nvSpPr>
-          <p:cNvPr id="3" name="Content Placeholder 2">
-            <a:extLst>
-              <a:ext uri="{FF2B5EF4-FFF2-40B4-BE49-F238E27FC236}">
-                <a16:creationId xmlns:a16="http://schemas.microsoft.com/office/drawing/2014/main" id="{2F751DE7-F873-E83D-E4A8-650E641EC288}"/>
-              </a:ext>
-            </a:extLst>
-          </p:cNvPr>
-          <p:cNvSpPr>
-            <a:spLocks noGrp="1"/>
-          </p:cNvSpPr>
-          <p:nvPr>
-            <p:ph idx="1"/>
-          </p:nvPr>
-        </p:nvSpPr>
-        <p:spPr/>
-        <p:txBody>
-          <a:bodyPr>
-            <a:normAutofit fontScale="92500" lnSpcReduction="10000"/>
-          </a:bodyPr>
-          <a:lstStyle/>
-          <a:p>
-            <a:r>
-              <a:rPr lang="da-DK" dirty="0"/>
-              <a:t>Model: </a:t>
-            </a:r>
-            <a:r>
-              <a:rPr lang="en-US" dirty="0"/>
-              <a:t>structure of asset data, reflects the database schema</a:t>
-            </a:r>
-            <a:endParaRPr lang="da-DK" dirty="0"/>
-          </a:p>
-          <a:p>
-            <a:r>
-              <a:rPr lang="da-DK" dirty="0"/>
-              <a:t>Data: </a:t>
-            </a:r>
-            <a:r>
-              <a:rPr lang="en-US" dirty="0"/>
-              <a:t>Entity Framework Core (EF Core) context, for managing the interaction between the application and the database</a:t>
-            </a:r>
-            <a:endParaRPr lang="da-DK" dirty="0"/>
-          </a:p>
-          <a:p>
-            <a:r>
-              <a:rPr lang="da-DK" dirty="0" err="1"/>
-              <a:t>Validator</a:t>
-            </a:r>
-            <a:r>
-              <a:rPr lang="da-DK" dirty="0"/>
-              <a:t>: </a:t>
-            </a:r>
-            <a:r>
-              <a:rPr lang="en-US" dirty="0"/>
-              <a:t>checks the integrity and correctness of the objects before they are persisted to the database.</a:t>
-            </a:r>
-            <a:endParaRPr lang="da-DK" dirty="0"/>
-          </a:p>
-          <a:p>
-            <a:r>
-              <a:rPr lang="da-DK" dirty="0"/>
-              <a:t>Repository: </a:t>
-            </a:r>
-            <a:r>
-              <a:rPr lang="en-US" dirty="0"/>
-              <a:t>Encapsulates data access logic: CRUD operations, logging.</a:t>
-            </a:r>
-            <a:endParaRPr lang="da-DK" dirty="0"/>
-          </a:p>
-          <a:p>
-            <a:r>
-              <a:rPr lang="da-DK" dirty="0"/>
-              <a:t>Services: </a:t>
-            </a:r>
-            <a:r>
-              <a:rPr lang="en-US" dirty="0"/>
-              <a:t>an intermediary between the repository and the API controller.</a:t>
-            </a:r>
-          </a:p>
-          <a:p>
-            <a:r>
-              <a:rPr lang="da-DK" dirty="0"/>
-              <a:t>Security: </a:t>
-            </a:r>
-            <a:r>
-              <a:rPr lang="da-DK" dirty="0" err="1"/>
-              <a:t>authentication</a:t>
-            </a:r>
-            <a:r>
-              <a:rPr lang="da-DK" dirty="0"/>
-              <a:t> with JWT</a:t>
-            </a:r>
-          </a:p>
-          <a:p>
-            <a:r>
-              <a:rPr lang="da-DK" dirty="0"/>
-              <a:t>API controller: </a:t>
-            </a:r>
-            <a:r>
-              <a:rPr lang="da-DK" dirty="0" err="1"/>
-              <a:t>exposes</a:t>
-            </a:r>
-            <a:r>
-              <a:rPr lang="da-DK" dirty="0"/>
-              <a:t> </a:t>
-            </a:r>
-            <a:r>
-              <a:rPr lang="da-DK" dirty="0" err="1"/>
-              <a:t>endpoints</a:t>
-            </a:r>
-            <a:r>
-              <a:rPr lang="da-DK" dirty="0"/>
-              <a:t> for asset management.</a:t>
-            </a:r>
-          </a:p>
-          <a:p>
-            <a:r>
-              <a:rPr lang="da-DK" dirty="0"/>
-              <a:t>Program: </a:t>
-            </a:r>
-            <a:r>
-              <a:rPr lang="da-DK" dirty="0" err="1"/>
-              <a:t>configuration</a:t>
-            </a:r>
-            <a:r>
-              <a:rPr lang="da-DK" dirty="0"/>
-              <a:t>, </a:t>
-            </a:r>
-            <a:r>
-              <a:rPr lang="da-DK" dirty="0" err="1"/>
-              <a:t>initialize</a:t>
-            </a:r>
-            <a:r>
-              <a:rPr lang="da-DK" dirty="0"/>
-              <a:t> services, register </a:t>
-            </a:r>
-            <a:r>
-              <a:rPr lang="da-DK" dirty="0" err="1"/>
-              <a:t>dependencies</a:t>
-            </a:r>
-            <a:endParaRPr lang="en-US" dirty="0"/>
-          </a:p>
-        </p:txBody>
-      </p:sp>
-    </p:spTree>
-    <p:extLst>
-      <p:ext uri="{BB962C8B-B14F-4D97-AF65-F5344CB8AC3E}">
-        <p14:creationId xmlns:p14="http://schemas.microsoft.com/office/powerpoint/2010/main" val="776774302"/>
-      </p:ext>
-    </p:extLst>
-  </p:cSld>
-  <p:clrMapOvr>
-    <a:masterClrMapping/>
-  </p:clrMapOvr>
-</p:sld>
-</file>
-
-<file path=ppt/slides/slide20.xml><?xml version="1.0" encoding="utf-8"?>
+<file path=ppt/slides/slide21.xml><?xml version="1.0" encoding="utf-8"?>
 <p:sld xmlns:a="http://schemas.openxmlformats.org/drawingml/2006/main" xmlns:r="http://schemas.openxmlformats.org/officeDocument/2006/relationships" xmlns:p="http://schemas.openxmlformats.org/presentationml/2006/main">
   <p:cSld>
     <p:spTree>
@@ -5243,7 +5304,7 @@
 </p:sld>
 </file>
 
-<file path=ppt/slides/slide21.xml><?xml version="1.0" encoding="utf-8"?>
+<file path=ppt/slides/slide22.xml><?xml version="1.0" encoding="utf-8"?>
 <p:sld xmlns:a="http://schemas.openxmlformats.org/drawingml/2006/main" xmlns:r="http://schemas.openxmlformats.org/officeDocument/2006/relationships" xmlns:p="http://schemas.openxmlformats.org/presentationml/2006/main">
   <p:cSld>
     <p:spTree>
@@ -5335,7 +5396,7 @@
 </p:sld>
 </file>
 
-<file path=ppt/slides/slide22.xml><?xml version="1.0" encoding="utf-8"?>
+<file path=ppt/slides/slide23.xml><?xml version="1.0" encoding="utf-8"?>
 <p:sld xmlns:a="http://schemas.openxmlformats.org/drawingml/2006/main" xmlns:r="http://schemas.openxmlformats.org/officeDocument/2006/relationships" xmlns:p="http://schemas.openxmlformats.org/presentationml/2006/main">
   <p:cSld>
     <p:spTree>
@@ -5447,7 +5508,7 @@
 </p:sld>
 </file>
 
-<file path=ppt/slides/slide23.xml><?xml version="1.0" encoding="utf-8"?>
+<file path=ppt/slides/slide24.xml><?xml version="1.0" encoding="utf-8"?>
 <p:sld xmlns:a="http://schemas.openxmlformats.org/drawingml/2006/main" xmlns:r="http://schemas.openxmlformats.org/officeDocument/2006/relationships" xmlns:p="http://schemas.openxmlformats.org/presentationml/2006/main">
   <p:cSld>
     <p:spTree>
@@ -5539,7 +5600,7 @@
 </p:sld>
 </file>
 
-<file path=ppt/slides/slide24.xml><?xml version="1.0" encoding="utf-8"?>
+<file path=ppt/slides/slide25.xml><?xml version="1.0" encoding="utf-8"?>
 <p:sld xmlns:a="http://schemas.openxmlformats.org/drawingml/2006/main" xmlns:r="http://schemas.openxmlformats.org/officeDocument/2006/relationships" xmlns:p="http://schemas.openxmlformats.org/presentationml/2006/main">
   <p:cSld>
     <p:spTree>
@@ -5643,7 +5704,7 @@
 </p:sld>
 </file>
 
-<file path=ppt/slides/slide25.xml><?xml version="1.0" encoding="utf-8"?>
+<file path=ppt/slides/slide26.xml><?xml version="1.0" encoding="utf-8"?>
 <p:sld xmlns:a="http://schemas.openxmlformats.org/drawingml/2006/main" xmlns:r="http://schemas.openxmlformats.org/officeDocument/2006/relationships" xmlns:p="http://schemas.openxmlformats.org/presentationml/2006/main">
   <p:cSld>
     <p:spTree>
@@ -5735,7 +5796,7 @@
 </p:sld>
 </file>
 
-<file path=ppt/slides/slide26.xml><?xml version="1.0" encoding="utf-8"?>
+<file path=ppt/slides/slide27.xml><?xml version="1.0" encoding="utf-8"?>
 <p:sld xmlns:a="http://schemas.openxmlformats.org/drawingml/2006/main" xmlns:r="http://schemas.openxmlformats.org/officeDocument/2006/relationships" xmlns:p="http://schemas.openxmlformats.org/presentationml/2006/main">
   <p:cSld>
     <p:spTree>
@@ -5849,7 +5910,7 @@
           <p:cNvPr id="2" name="Title 1">
             <a:extLst>
               <a:ext uri="{FF2B5EF4-FFF2-40B4-BE49-F238E27FC236}">
-                <a16:creationId xmlns:a16="http://schemas.microsoft.com/office/drawing/2014/main" id="{0E18ABF8-A3C4-268E-0EF9-3144FE1EBDAB}"/>
+                <a16:creationId xmlns:a16="http://schemas.microsoft.com/office/drawing/2014/main" id="{20CC4272-FB95-82B8-1736-52882955AE9F}"/>
               </a:ext>
             </a:extLst>
           </p:cNvPr>
@@ -5866,56 +5927,162 @@
           <a:lstStyle/>
           <a:p>
             <a:r>
-              <a:rPr lang="da-DK" dirty="0"/>
-              <a:t>Application </a:t>
-            </a:r>
-            <a:r>
-              <a:rPr lang="da-DK" dirty="0" err="1"/>
-              <a:t>architecture</a:t>
+              <a:rPr lang="da-DK" dirty="0" err="1"/>
+              <a:t>Structure</a:t>
             </a:r>
             <a:endParaRPr lang="en-US" dirty="0"/>
           </a:p>
         </p:txBody>
       </p:sp>
-      <p:pic>
-        <p:nvPicPr>
-          <p:cNvPr id="5" name="Content Placeholder 4" descr="A diagram of a computer&#10;&#10;Description automatically generated">
-            <a:extLst>
-              <a:ext uri="{FF2B5EF4-FFF2-40B4-BE49-F238E27FC236}">
-                <a16:creationId xmlns:a16="http://schemas.microsoft.com/office/drawing/2014/main" id="{C1718BC8-85B7-6912-1300-F8C2D7E88BC6}"/>
-              </a:ext>
-            </a:extLst>
-          </p:cNvPr>
-          <p:cNvPicPr>
-            <a:picLocks noGrp="1" noChangeAspect="1"/>
-          </p:cNvPicPr>
+      <p:sp>
+        <p:nvSpPr>
+          <p:cNvPr id="3" name="Content Placeholder 2">
+            <a:extLst>
+              <a:ext uri="{FF2B5EF4-FFF2-40B4-BE49-F238E27FC236}">
+                <a16:creationId xmlns:a16="http://schemas.microsoft.com/office/drawing/2014/main" id="{2F751DE7-F873-E83D-E4A8-650E641EC288}"/>
+              </a:ext>
+            </a:extLst>
+          </p:cNvPr>
+          <p:cNvSpPr>
+            <a:spLocks noGrp="1"/>
+          </p:cNvSpPr>
           <p:nvPr>
             <p:ph idx="1"/>
           </p:nvPr>
-        </p:nvPicPr>
-        <p:blipFill>
-          <a:blip r:embed="rId2">
-            <a:extLst>
-              <a:ext uri="{28A0092B-C50C-407E-A947-70E740481C1C}">
-                <a14:useLocalDpi xmlns:a14="http://schemas.microsoft.com/office/drawing/2010/main" val="0"/>
-              </a:ext>
-            </a:extLst>
-          </a:blip>
-          <a:stretch>
-            <a:fillRect/>
-          </a:stretch>
-        </p:blipFill>
-        <p:spPr>
-          <a:xfrm>
-            <a:off x="2744294" y="1825625"/>
-            <a:ext cx="6703412" cy="4351338"/>
-          </a:xfrm>
-        </p:spPr>
-      </p:pic>
+        </p:nvSpPr>
+        <p:spPr/>
+        <p:txBody>
+          <a:bodyPr>
+            <a:normAutofit fontScale="92500" lnSpcReduction="10000"/>
+          </a:bodyPr>
+          <a:lstStyle/>
+          <a:p>
+            <a:r>
+              <a:rPr lang="da-DK" dirty="0"/>
+              <a:t>Model: </a:t>
+            </a:r>
+            <a:r>
+              <a:rPr lang="en-US" dirty="0"/>
+              <a:t>structure of asset data, reflects the database schema</a:t>
+            </a:r>
+            <a:endParaRPr lang="da-DK" dirty="0"/>
+          </a:p>
+          <a:p>
+            <a:r>
+              <a:rPr lang="da-DK" dirty="0"/>
+              <a:t>Data: </a:t>
+            </a:r>
+            <a:r>
+              <a:rPr lang="en-US" dirty="0"/>
+              <a:t>Entity Framework Core (EF Core) context, for managing the interaction between the application and the database</a:t>
+            </a:r>
+            <a:endParaRPr lang="da-DK" dirty="0"/>
+          </a:p>
+          <a:p>
+            <a:r>
+              <a:rPr lang="da-DK" dirty="0" err="1"/>
+              <a:t>Validator</a:t>
+            </a:r>
+            <a:r>
+              <a:rPr lang="da-DK" dirty="0"/>
+              <a:t>: </a:t>
+            </a:r>
+            <a:r>
+              <a:rPr lang="en-US" dirty="0"/>
+              <a:t>checks the integrity and correctness of the objects before they are persisted to the database.</a:t>
+            </a:r>
+            <a:endParaRPr lang="da-DK" dirty="0"/>
+          </a:p>
+          <a:p>
+            <a:r>
+              <a:rPr lang="da-DK" dirty="0"/>
+              <a:t>Repository: </a:t>
+            </a:r>
+            <a:r>
+              <a:rPr lang="en-US" dirty="0"/>
+              <a:t>Encapsulates data access logic: CRUD operations, logging.</a:t>
+            </a:r>
+            <a:endParaRPr lang="da-DK" dirty="0"/>
+          </a:p>
+          <a:p>
+            <a:r>
+              <a:rPr lang="da-DK" dirty="0"/>
+              <a:t>Services: </a:t>
+            </a:r>
+            <a:r>
+              <a:rPr lang="en-US" dirty="0"/>
+              <a:t>an intermediary between the repository and the API controller.</a:t>
+            </a:r>
+          </a:p>
+          <a:p>
+            <a:r>
+              <a:rPr lang="da-DK" dirty="0"/>
+              <a:t>Security: </a:t>
+            </a:r>
+            <a:r>
+              <a:rPr lang="da-DK" dirty="0" err="1"/>
+              <a:t>authentication</a:t>
+            </a:r>
+            <a:r>
+              <a:rPr lang="da-DK" dirty="0"/>
+              <a:t> with JWT</a:t>
+            </a:r>
+          </a:p>
+          <a:p>
+            <a:r>
+              <a:rPr lang="da-DK" dirty="0"/>
+              <a:t>API controller: </a:t>
+            </a:r>
+            <a:r>
+              <a:rPr lang="da-DK" dirty="0" err="1"/>
+              <a:t>exposes</a:t>
+            </a:r>
+            <a:r>
+              <a:rPr lang="da-DK" dirty="0"/>
+              <a:t> </a:t>
+            </a:r>
+            <a:r>
+              <a:rPr lang="da-DK" dirty="0" err="1"/>
+              <a:t>endpoints</a:t>
+            </a:r>
+            <a:r>
+              <a:rPr lang="da-DK" dirty="0"/>
+              <a:t> for asset management.</a:t>
+            </a:r>
+          </a:p>
+          <a:p>
+            <a:r>
+              <a:rPr lang="da-DK" dirty="0"/>
+              <a:t>Program: </a:t>
+            </a:r>
+            <a:r>
+              <a:rPr lang="da-DK" dirty="0" err="1"/>
+              <a:t>configuration</a:t>
+            </a:r>
+            <a:r>
+              <a:rPr lang="da-DK" dirty="0"/>
+              <a:t>, </a:t>
+            </a:r>
+            <a:r>
+              <a:rPr lang="da-DK" dirty="0" err="1"/>
+              <a:t>initialize</a:t>
+            </a:r>
+            <a:r>
+              <a:rPr lang="da-DK" dirty="0"/>
+              <a:t> services, register </a:t>
+            </a:r>
+            <a:r>
+              <a:rPr lang="da-DK" dirty="0" err="1"/>
+              <a:t>dependencies</a:t>
+            </a:r>
+            <a:endParaRPr lang="en-US" dirty="0"/>
+          </a:p>
+        </p:txBody>
+      </p:sp>
     </p:spTree>
     <p:extLst>
       <p:ext uri="{BB962C8B-B14F-4D97-AF65-F5344CB8AC3E}">
-        <p14:creationId xmlns:p14="http://schemas.microsoft.com/office/powerpoint/2010/main" val="1629306891"/>
+        <p14:creationId xmlns:p14="http://schemas.microsoft.com/office/powerpoint/2010/main" val="776774302"/>
       </p:ext>
     </p:extLst>
   </p:cSld>
@@ -5947,7 +6114,7 @@
           <p:cNvPr id="2" name="Title 1">
             <a:extLst>
               <a:ext uri="{FF2B5EF4-FFF2-40B4-BE49-F238E27FC236}">
-                <a16:creationId xmlns:a16="http://schemas.microsoft.com/office/drawing/2014/main" id="{45214209-4B5B-207D-77B5-7A7CCFBA7E90}"/>
+                <a16:creationId xmlns:a16="http://schemas.microsoft.com/office/drawing/2014/main" id="{ED30432C-EDE9-7671-8E9B-C75400995799}"/>
               </a:ext>
             </a:extLst>
           </p:cNvPr>
@@ -5965,55 +6132,121 @@
           <a:p>
             <a:r>
               <a:rPr lang="da-DK" dirty="0"/>
-              <a:t>Application </a:t>
-            </a:r>
-            <a:r>
-              <a:rPr lang="da-DK" dirty="0" err="1"/>
-              <a:t>architecture</a:t>
+              <a:t>Design </a:t>
+            </a:r>
+            <a:r>
+              <a:rPr lang="da-DK" dirty="0" err="1"/>
+              <a:t>principle</a:t>
             </a:r>
             <a:endParaRPr lang="en-US" dirty="0"/>
           </a:p>
         </p:txBody>
       </p:sp>
-      <p:pic>
-        <p:nvPicPr>
-          <p:cNvPr id="6" name="Content Placeholder 5">
-            <a:extLst>
-              <a:ext uri="{FF2B5EF4-FFF2-40B4-BE49-F238E27FC236}">
-                <a16:creationId xmlns:a16="http://schemas.microsoft.com/office/drawing/2014/main" id="{34970469-B5A4-41A9-629B-A089549ED9F0}"/>
-              </a:ext>
-            </a:extLst>
-          </p:cNvPr>
-          <p:cNvPicPr>
-            <a:picLocks noGrp="1" noChangeAspect="1"/>
-          </p:cNvPicPr>
+      <p:sp>
+        <p:nvSpPr>
+          <p:cNvPr id="3" name="Content Placeholder 2">
+            <a:extLst>
+              <a:ext uri="{FF2B5EF4-FFF2-40B4-BE49-F238E27FC236}">
+                <a16:creationId xmlns:a16="http://schemas.microsoft.com/office/drawing/2014/main" id="{3D010048-FC61-8D3D-6C5E-A1173E15A69D}"/>
+              </a:ext>
+            </a:extLst>
+          </p:cNvPr>
+          <p:cNvSpPr>
+            <a:spLocks noGrp="1"/>
+          </p:cNvSpPr>
           <p:nvPr>
             <p:ph idx="1"/>
           </p:nvPr>
-        </p:nvPicPr>
-        <p:blipFill>
-          <a:blip r:embed="rId2">
-            <a:extLst>
-              <a:ext uri="{28A0092B-C50C-407E-A947-70E740481C1C}">
-                <a14:useLocalDpi xmlns:a14="http://schemas.microsoft.com/office/drawing/2010/main" val="0"/>
-              </a:ext>
-            </a:extLst>
-          </a:blip>
-          <a:stretch>
-            <a:fillRect/>
-          </a:stretch>
-        </p:blipFill>
-        <p:spPr>
-          <a:xfrm>
-            <a:off x="1821516" y="1865382"/>
-            <a:ext cx="6815583" cy="4351338"/>
-          </a:xfrm>
-        </p:spPr>
-      </p:pic>
+        </p:nvSpPr>
+        <p:spPr/>
+        <p:txBody>
+          <a:bodyPr/>
+          <a:lstStyle/>
+          <a:p>
+            <a:r>
+              <a:rPr lang="da-DK" dirty="0"/>
+              <a:t>Rest API design</a:t>
+            </a:r>
+          </a:p>
+          <a:p>
+            <a:r>
+              <a:rPr lang="da-DK" dirty="0"/>
+              <a:t>Separation of </a:t>
+            </a:r>
+            <a:r>
+              <a:rPr lang="da-DK" dirty="0" err="1"/>
+              <a:t>Concerns</a:t>
+            </a:r>
+            <a:r>
+              <a:rPr lang="da-DK" dirty="0"/>
+              <a:t>: controller, service, Repository, Data, Model</a:t>
+            </a:r>
+          </a:p>
+          <a:p>
+            <a:r>
+              <a:rPr lang="da-DK" dirty="0" err="1"/>
+              <a:t>Dependency</a:t>
+            </a:r>
+            <a:r>
+              <a:rPr lang="da-DK" dirty="0"/>
+              <a:t> </a:t>
+            </a:r>
+            <a:r>
+              <a:rPr lang="da-DK" dirty="0" err="1"/>
+              <a:t>injection</a:t>
+            </a:r>
+            <a:endParaRPr lang="da-DK" dirty="0"/>
+          </a:p>
+          <a:p>
+            <a:r>
+              <a:rPr lang="da-DK" dirty="0" err="1"/>
+              <a:t>Validation</a:t>
+            </a:r>
+            <a:endParaRPr lang="da-DK" dirty="0"/>
+          </a:p>
+          <a:p>
+            <a:r>
+              <a:rPr lang="da-DK" dirty="0"/>
+              <a:t>Sensitive data is not </a:t>
+            </a:r>
+            <a:r>
+              <a:rPr lang="da-DK" dirty="0" err="1"/>
+              <a:t>exposed</a:t>
+            </a:r>
+            <a:r>
+              <a:rPr lang="da-DK" dirty="0"/>
+              <a:t> via </a:t>
+            </a:r>
+            <a:r>
+              <a:rPr lang="da-DK" dirty="0" err="1"/>
+              <a:t>APIs</a:t>
+            </a:r>
+            <a:r>
+              <a:rPr lang="da-DK" dirty="0"/>
+              <a:t>.</a:t>
+            </a:r>
+          </a:p>
+          <a:p>
+            <a:r>
+              <a:rPr lang="da-DK" dirty="0" err="1"/>
+              <a:t>Exception</a:t>
+            </a:r>
+            <a:r>
+              <a:rPr lang="da-DK" dirty="0"/>
+              <a:t> handling, </a:t>
+            </a:r>
+            <a:r>
+              <a:rPr lang="da-DK" dirty="0" err="1"/>
+              <a:t>logging</a:t>
+            </a:r>
+            <a:endParaRPr lang="en-US" dirty="0"/>
+          </a:p>
+        </p:txBody>
+      </p:sp>
     </p:spTree>
     <p:extLst>
       <p:ext uri="{BB962C8B-B14F-4D97-AF65-F5344CB8AC3E}">
-        <p14:creationId xmlns:p14="http://schemas.microsoft.com/office/powerpoint/2010/main" val="3549081919"/>
+        <p14:creationId xmlns:p14="http://schemas.microsoft.com/office/powerpoint/2010/main" val="3790079635"/>
       </p:ext>
     </p:extLst>
   </p:cSld>
@@ -6045,7 +6278,7 @@
           <p:cNvPr id="2" name="Title 1">
             <a:extLst>
               <a:ext uri="{FF2B5EF4-FFF2-40B4-BE49-F238E27FC236}">
-                <a16:creationId xmlns:a16="http://schemas.microsoft.com/office/drawing/2014/main" id="{C81E7EBF-E9A0-52E2-F878-8F477396CD53}"/>
+                <a16:creationId xmlns:a16="http://schemas.microsoft.com/office/drawing/2014/main" id="{F092A846-EE04-8E1F-FE9A-FA9435FBF877}"/>
               </a:ext>
             </a:extLst>
           </p:cNvPr>
@@ -6062,64 +6295,89 @@
           <a:lstStyle/>
           <a:p>
             <a:r>
-              <a:rPr lang="da-DK" dirty="0" err="1"/>
-              <a:t>Example</a:t>
-            </a:r>
-            <a:r>
-              <a:rPr lang="da-DK" dirty="0"/>
-              <a:t>: </a:t>
-            </a:r>
-            <a:r>
-              <a:rPr lang="da-DK" dirty="0" err="1"/>
-              <a:t>Get</a:t>
-            </a:r>
-            <a:r>
-              <a:rPr lang="da-DK" dirty="0"/>
-              <a:t> all assets metadata</a:t>
+              <a:rPr lang="da-DK" dirty="0"/>
+              <a:t>Target: </a:t>
+            </a:r>
+            <a:r>
+              <a:rPr lang="en-US" dirty="0"/>
+              <a:t>Use REST APIs for communication between microservices</a:t>
+            </a:r>
+          </a:p>
+        </p:txBody>
+      </p:sp>
+      <p:sp>
+        <p:nvSpPr>
+          <p:cNvPr id="3" name="Content Placeholder 2">
+            <a:extLst>
+              <a:ext uri="{FF2B5EF4-FFF2-40B4-BE49-F238E27FC236}">
+                <a16:creationId xmlns:a16="http://schemas.microsoft.com/office/drawing/2014/main" id="{52338E57-85E1-49A7-AAD9-771F762FA7FC}"/>
+              </a:ext>
+            </a:extLst>
+          </p:cNvPr>
+          <p:cNvSpPr>
+            <a:spLocks noGrp="1"/>
+          </p:cNvSpPr>
+          <p:nvPr>
+            <p:ph idx="1"/>
+          </p:nvPr>
+        </p:nvSpPr>
+        <p:spPr/>
+        <p:txBody>
+          <a:bodyPr/>
+          <a:lstStyle/>
+          <a:p>
+            <a:r>
+              <a:rPr lang="en-US" dirty="0"/>
+              <a:t>APIs for Authentication: auth user and issue </a:t>
+            </a:r>
+            <a:r>
+              <a:rPr lang="en-US" dirty="0" err="1"/>
+              <a:t>jwt</a:t>
+            </a:r>
+            <a:r>
+              <a:rPr lang="en-US" dirty="0"/>
+              <a:t> token</a:t>
+            </a:r>
+          </a:p>
+          <a:p>
+            <a:r>
+              <a:rPr lang="en-US" dirty="0"/>
+              <a:t>APIs for </a:t>
+            </a:r>
+            <a:r>
+              <a:rPr lang="en-US" dirty="0" err="1"/>
+              <a:t>AssetMetadata</a:t>
             </a:r>
             <a:endParaRPr lang="en-US" dirty="0"/>
           </a:p>
-        </p:txBody>
-      </p:sp>
-      <p:pic>
-        <p:nvPicPr>
-          <p:cNvPr id="9" name="Content Placeholder 8">
-            <a:extLst>
-              <a:ext uri="{FF2B5EF4-FFF2-40B4-BE49-F238E27FC236}">
-                <a16:creationId xmlns:a16="http://schemas.microsoft.com/office/drawing/2014/main" id="{89EA45AB-4657-89C8-FA6A-67FB0E9D70F6}"/>
-              </a:ext>
-            </a:extLst>
-          </p:cNvPr>
-          <p:cNvPicPr>
-            <a:picLocks noGrp="1" noChangeAspect="1"/>
-          </p:cNvPicPr>
-          <p:nvPr>
-            <p:ph idx="1"/>
-          </p:nvPr>
-        </p:nvPicPr>
-        <p:blipFill>
-          <a:blip r:embed="rId2">
-            <a:extLst>
-              <a:ext uri="{28A0092B-C50C-407E-A947-70E740481C1C}">
-                <a14:useLocalDpi xmlns:a14="http://schemas.microsoft.com/office/drawing/2010/main" val="0"/>
-              </a:ext>
-            </a:extLst>
-          </a:blip>
-          <a:stretch>
-            <a:fillRect/>
-          </a:stretch>
-        </p:blipFill>
-        <p:spPr>
-          <a:xfrm>
-            <a:off x="1301486" y="1905138"/>
-            <a:ext cx="5549765" cy="4351338"/>
-          </a:xfrm>
-        </p:spPr>
-      </p:pic>
+          <a:p>
+            <a:r>
+              <a:rPr lang="en-US" dirty="0"/>
+              <a:t>APIs for </a:t>
+            </a:r>
+            <a:r>
+              <a:rPr lang="en-US" dirty="0" err="1"/>
+              <a:t>BriefingMetadata</a:t>
+            </a:r>
+            <a:endParaRPr lang="en-US" dirty="0"/>
+          </a:p>
+          <a:p>
+            <a:r>
+              <a:rPr lang="en-US" dirty="0"/>
+              <a:t>APIs for </a:t>
+            </a:r>
+            <a:r>
+              <a:rPr lang="en-US" dirty="0" err="1"/>
+              <a:t>ContentDistributionMetadata</a:t>
+            </a:r>
+            <a:endParaRPr lang="en-US" dirty="0"/>
+          </a:p>
+        </p:txBody>
+      </p:sp>
     </p:spTree>
     <p:extLst>
       <p:ext uri="{BB962C8B-B14F-4D97-AF65-F5344CB8AC3E}">
-        <p14:creationId xmlns:p14="http://schemas.microsoft.com/office/powerpoint/2010/main" val="315548689"/>
+        <p14:creationId xmlns:p14="http://schemas.microsoft.com/office/powerpoint/2010/main" val="2872034448"/>
       </p:ext>
     </p:extLst>
   </p:cSld>
@@ -6151,7 +6409,7 @@
           <p:cNvPr id="2" name="Title 1">
             <a:extLst>
               <a:ext uri="{FF2B5EF4-FFF2-40B4-BE49-F238E27FC236}">
-                <a16:creationId xmlns:a16="http://schemas.microsoft.com/office/drawing/2014/main" id="{ED30432C-EDE9-7671-8E9B-C75400995799}"/>
+                <a16:creationId xmlns:a16="http://schemas.microsoft.com/office/drawing/2014/main" id="{0E18ABF8-A3C4-268E-0EF9-3144FE1EBDAB}"/>
               </a:ext>
             </a:extLst>
           </p:cNvPr>
@@ -6169,129 +6427,55 @@
           <a:p>
             <a:r>
               <a:rPr lang="da-DK" dirty="0"/>
-              <a:t>Design </a:t>
-            </a:r>
-            <a:r>
-              <a:rPr lang="da-DK" dirty="0" err="1"/>
-              <a:t>principle</a:t>
+              <a:t>Application </a:t>
+            </a:r>
+            <a:r>
+              <a:rPr lang="da-DK" dirty="0" err="1"/>
+              <a:t>architecture</a:t>
             </a:r>
             <a:endParaRPr lang="en-US" dirty="0"/>
           </a:p>
         </p:txBody>
       </p:sp>
-      <p:sp>
-        <p:nvSpPr>
-          <p:cNvPr id="3" name="Content Placeholder 2">
-            <a:extLst>
-              <a:ext uri="{FF2B5EF4-FFF2-40B4-BE49-F238E27FC236}">
-                <a16:creationId xmlns:a16="http://schemas.microsoft.com/office/drawing/2014/main" id="{3D010048-FC61-8D3D-6C5E-A1173E15A69D}"/>
-              </a:ext>
-            </a:extLst>
-          </p:cNvPr>
-          <p:cNvSpPr>
-            <a:spLocks noGrp="1"/>
-          </p:cNvSpPr>
+      <p:pic>
+        <p:nvPicPr>
+          <p:cNvPr id="5" name="Content Placeholder 4" descr="A diagram of a computer&#10;&#10;Description automatically generated">
+            <a:extLst>
+              <a:ext uri="{FF2B5EF4-FFF2-40B4-BE49-F238E27FC236}">
+                <a16:creationId xmlns:a16="http://schemas.microsoft.com/office/drawing/2014/main" id="{C1718BC8-85B7-6912-1300-F8C2D7E88BC6}"/>
+              </a:ext>
+            </a:extLst>
+          </p:cNvPr>
+          <p:cNvPicPr>
+            <a:picLocks noGrp="1" noChangeAspect="1"/>
+          </p:cNvPicPr>
           <p:nvPr>
             <p:ph idx="1"/>
           </p:nvPr>
-        </p:nvSpPr>
-        <p:spPr/>
-        <p:txBody>
-          <a:bodyPr/>
-          <a:lstStyle/>
-          <a:p>
-            <a:r>
-              <a:rPr lang="da-DK" dirty="0"/>
-              <a:t>Rest API design</a:t>
-            </a:r>
-          </a:p>
-          <a:p>
-            <a:r>
-              <a:rPr lang="da-DK" dirty="0"/>
-              <a:t>Separation of </a:t>
-            </a:r>
-            <a:r>
-              <a:rPr lang="da-DK" dirty="0" err="1"/>
-              <a:t>Concerns</a:t>
-            </a:r>
-            <a:r>
-              <a:rPr lang="da-DK" dirty="0"/>
-              <a:t>: controller, services, </a:t>
-            </a:r>
-            <a:r>
-              <a:rPr lang="da-DK" dirty="0" err="1"/>
-              <a:t>Repotories</a:t>
-            </a:r>
-            <a:r>
-              <a:rPr lang="da-DK" dirty="0"/>
-              <a:t>, Data, Models</a:t>
-            </a:r>
-          </a:p>
-          <a:p>
-            <a:r>
-              <a:rPr lang="da-DK" dirty="0" err="1"/>
-              <a:t>Dependency</a:t>
-            </a:r>
-            <a:r>
-              <a:rPr lang="da-DK" dirty="0"/>
-              <a:t> </a:t>
-            </a:r>
-            <a:r>
-              <a:rPr lang="da-DK" dirty="0" err="1"/>
-              <a:t>injection</a:t>
-            </a:r>
-            <a:endParaRPr lang="da-DK" dirty="0"/>
-          </a:p>
-          <a:p>
-            <a:r>
-              <a:rPr lang="da-DK" dirty="0" err="1"/>
-              <a:t>Validation</a:t>
-            </a:r>
-            <a:endParaRPr lang="da-DK" dirty="0"/>
-          </a:p>
-          <a:p>
-            <a:r>
-              <a:rPr lang="da-DK" dirty="0"/>
-              <a:t>Sensitive data is not </a:t>
-            </a:r>
-            <a:r>
-              <a:rPr lang="da-DK" dirty="0" err="1"/>
-              <a:t>exposed</a:t>
-            </a:r>
-            <a:r>
-              <a:rPr lang="da-DK" dirty="0"/>
-              <a:t> via </a:t>
-            </a:r>
-            <a:r>
-              <a:rPr lang="da-DK" dirty="0" err="1"/>
-              <a:t>APIs</a:t>
-            </a:r>
-            <a:r>
-              <a:rPr lang="da-DK" dirty="0"/>
-              <a:t>.</a:t>
-            </a:r>
-          </a:p>
-          <a:p>
-            <a:r>
-              <a:rPr lang="da-DK" dirty="0" err="1"/>
-              <a:t>Exception</a:t>
-            </a:r>
-            <a:r>
-              <a:rPr lang="da-DK" dirty="0"/>
-              <a:t> handling, </a:t>
-            </a:r>
-            <a:r>
-              <a:rPr lang="da-DK" dirty="0" err="1"/>
-              <a:t>logging</a:t>
-            </a:r>
-            <a:endParaRPr lang="en-US" dirty="0"/>
-          </a:p>
-        </p:txBody>
-      </p:sp>
+        </p:nvPicPr>
+        <p:blipFill>
+          <a:blip r:embed="rId2">
+            <a:extLst>
+              <a:ext uri="{28A0092B-C50C-407E-A947-70E740481C1C}">
+                <a14:useLocalDpi xmlns:a14="http://schemas.microsoft.com/office/drawing/2010/main" val="0"/>
+              </a:ext>
+            </a:extLst>
+          </a:blip>
+          <a:stretch>
+            <a:fillRect/>
+          </a:stretch>
+        </p:blipFill>
+        <p:spPr>
+          <a:xfrm>
+            <a:off x="2744294" y="1825625"/>
+            <a:ext cx="6703412" cy="4351338"/>
+          </a:xfrm>
+        </p:spPr>
+      </p:pic>
     </p:spTree>
     <p:extLst>
       <p:ext uri="{BB962C8B-B14F-4D97-AF65-F5344CB8AC3E}">
-        <p14:creationId xmlns:p14="http://schemas.microsoft.com/office/powerpoint/2010/main" val="3790079635"/>
+        <p14:creationId xmlns:p14="http://schemas.microsoft.com/office/powerpoint/2010/main" val="1629306891"/>
       </p:ext>
     </p:extLst>
   </p:cSld>
@@ -6323,7 +6507,7 @@
           <p:cNvPr id="2" name="Title 1">
             <a:extLst>
               <a:ext uri="{FF2B5EF4-FFF2-40B4-BE49-F238E27FC236}">
-                <a16:creationId xmlns:a16="http://schemas.microsoft.com/office/drawing/2014/main" id="{F092A846-EE04-8E1F-FE9A-FA9435FBF877}"/>
+                <a16:creationId xmlns:a16="http://schemas.microsoft.com/office/drawing/2014/main" id="{45214209-4B5B-207D-77B5-7A7CCFBA7E90}"/>
               </a:ext>
             </a:extLst>
           </p:cNvPr>
@@ -6341,88 +6525,51 @@
           <a:p>
             <a:r>
               <a:rPr lang="da-DK" dirty="0"/>
-              <a:t>Target: </a:t>
-            </a:r>
-            <a:r>
-              <a:rPr lang="en-US" dirty="0"/>
-              <a:t>Use REST APIs for communication between microservices</a:t>
-            </a:r>
-          </a:p>
-        </p:txBody>
-      </p:sp>
-      <p:sp>
-        <p:nvSpPr>
-          <p:cNvPr id="3" name="Content Placeholder 2">
-            <a:extLst>
-              <a:ext uri="{FF2B5EF4-FFF2-40B4-BE49-F238E27FC236}">
-                <a16:creationId xmlns:a16="http://schemas.microsoft.com/office/drawing/2014/main" id="{52338E57-85E1-49A7-AAD9-771F762FA7FC}"/>
-              </a:ext>
-            </a:extLst>
-          </p:cNvPr>
-          <p:cNvSpPr>
-            <a:spLocks noGrp="1"/>
-          </p:cNvSpPr>
+              <a:t>Components</a:t>
+            </a:r>
+            <a:endParaRPr lang="en-US" dirty="0"/>
+          </a:p>
+        </p:txBody>
+      </p:sp>
+      <p:pic>
+        <p:nvPicPr>
+          <p:cNvPr id="6" name="Content Placeholder 5">
+            <a:extLst>
+              <a:ext uri="{FF2B5EF4-FFF2-40B4-BE49-F238E27FC236}">
+                <a16:creationId xmlns:a16="http://schemas.microsoft.com/office/drawing/2014/main" id="{34970469-B5A4-41A9-629B-A089549ED9F0}"/>
+              </a:ext>
+            </a:extLst>
+          </p:cNvPr>
+          <p:cNvPicPr>
+            <a:picLocks noGrp="1" noChangeAspect="1"/>
+          </p:cNvPicPr>
           <p:nvPr>
             <p:ph idx="1"/>
           </p:nvPr>
-        </p:nvSpPr>
-        <p:spPr/>
-        <p:txBody>
-          <a:bodyPr/>
-          <a:lstStyle/>
-          <a:p>
-            <a:r>
-              <a:rPr lang="en-US" dirty="0"/>
-              <a:t>APIs for Authentication: auth user and issue </a:t>
-            </a:r>
-            <a:r>
-              <a:rPr lang="en-US" dirty="0" err="1"/>
-              <a:t>jwt</a:t>
-            </a:r>
-            <a:r>
-              <a:rPr lang="en-US" dirty="0"/>
-              <a:t> token</a:t>
-            </a:r>
-          </a:p>
-          <a:p>
-            <a:r>
-              <a:rPr lang="en-US" dirty="0"/>
-              <a:t>APIs for </a:t>
-            </a:r>
-            <a:r>
-              <a:rPr lang="en-US" dirty="0" err="1"/>
-              <a:t>AssetMetadata</a:t>
-            </a:r>
-            <a:endParaRPr lang="en-US" dirty="0"/>
-          </a:p>
-          <a:p>
-            <a:r>
-              <a:rPr lang="en-US" dirty="0"/>
-              <a:t>APIs for </a:t>
-            </a:r>
-            <a:r>
-              <a:rPr lang="en-US" dirty="0" err="1"/>
-              <a:t>BriefingMetadata</a:t>
-            </a:r>
-            <a:endParaRPr lang="en-US" dirty="0"/>
-          </a:p>
-          <a:p>
-            <a:r>
-              <a:rPr lang="en-US" dirty="0"/>
-              <a:t>APIs for </a:t>
-            </a:r>
-            <a:r>
-              <a:rPr lang="en-US" dirty="0" err="1"/>
-              <a:t>ContentDistributionMetadata</a:t>
-            </a:r>
-            <a:endParaRPr lang="en-US" dirty="0"/>
-          </a:p>
-        </p:txBody>
-      </p:sp>
+        </p:nvPicPr>
+        <p:blipFill>
+          <a:blip r:embed="rId2">
+            <a:extLst>
+              <a:ext uri="{28A0092B-C50C-407E-A947-70E740481C1C}">
+                <a14:useLocalDpi xmlns:a14="http://schemas.microsoft.com/office/drawing/2010/main" val="0"/>
+              </a:ext>
+            </a:extLst>
+          </a:blip>
+          <a:stretch>
+            <a:fillRect/>
+          </a:stretch>
+        </p:blipFill>
+        <p:spPr>
+          <a:xfrm>
+            <a:off x="1821516" y="1865382"/>
+            <a:ext cx="6815583" cy="4351338"/>
+          </a:xfrm>
+        </p:spPr>
+      </p:pic>
     </p:spTree>
     <p:extLst>
       <p:ext uri="{BB962C8B-B14F-4D97-AF65-F5344CB8AC3E}">
-        <p14:creationId xmlns:p14="http://schemas.microsoft.com/office/powerpoint/2010/main" val="2872034448"/>
+        <p14:creationId xmlns:p14="http://schemas.microsoft.com/office/powerpoint/2010/main" val="3549081919"/>
       </p:ext>
     </p:extLst>
   </p:cSld>
@@ -6454,7 +6601,7 @@
           <p:cNvPr id="2" name="Title 1">
             <a:extLst>
               <a:ext uri="{FF2B5EF4-FFF2-40B4-BE49-F238E27FC236}">
-                <a16:creationId xmlns:a16="http://schemas.microsoft.com/office/drawing/2014/main" id="{F02EEB8F-5CE0-4FC5-9BA1-0C505B693960}"/>
+                <a16:creationId xmlns:a16="http://schemas.microsoft.com/office/drawing/2014/main" id="{C81E7EBF-E9A0-52E2-F878-8F477396CD53}"/>
               </a:ext>
             </a:extLst>
           </p:cNvPr>
@@ -6472,84 +6619,63 @@
           <a:p>
             <a:r>
               <a:rPr lang="da-DK" dirty="0" err="1"/>
-              <a:t>Auth</a:t>
-            </a:r>
-            <a:r>
-              <a:rPr lang="da-DK" dirty="0"/>
-              <a:t> API</a:t>
+              <a:t>Example</a:t>
+            </a:r>
+            <a:r>
+              <a:rPr lang="da-DK" dirty="0"/>
+              <a:t>: </a:t>
+            </a:r>
+            <a:r>
+              <a:rPr lang="da-DK" dirty="0" err="1"/>
+              <a:t>Get</a:t>
+            </a:r>
+            <a:r>
+              <a:rPr lang="da-DK" dirty="0"/>
+              <a:t> all assets metadata</a:t>
             </a:r>
             <a:endParaRPr lang="en-US" dirty="0"/>
           </a:p>
         </p:txBody>
       </p:sp>
-      <p:sp>
-        <p:nvSpPr>
-          <p:cNvPr id="3" name="Content Placeholder 2">
-            <a:extLst>
-              <a:ext uri="{FF2B5EF4-FFF2-40B4-BE49-F238E27FC236}">
-                <a16:creationId xmlns:a16="http://schemas.microsoft.com/office/drawing/2014/main" id="{EFB92E96-BEE2-3015-D7C0-B631F73D8DD3}"/>
-              </a:ext>
-            </a:extLst>
-          </p:cNvPr>
-          <p:cNvSpPr>
-            <a:spLocks noGrp="1"/>
-          </p:cNvSpPr>
+      <p:pic>
+        <p:nvPicPr>
+          <p:cNvPr id="9" name="Content Placeholder 8">
+            <a:extLst>
+              <a:ext uri="{FF2B5EF4-FFF2-40B4-BE49-F238E27FC236}">
+                <a16:creationId xmlns:a16="http://schemas.microsoft.com/office/drawing/2014/main" id="{89EA45AB-4657-89C8-FA6A-67FB0E9D70F6}"/>
+              </a:ext>
+            </a:extLst>
+          </p:cNvPr>
+          <p:cNvPicPr>
+            <a:picLocks noGrp="1" noChangeAspect="1"/>
+          </p:cNvPicPr>
           <p:nvPr>
             <p:ph idx="1"/>
           </p:nvPr>
-        </p:nvSpPr>
-        <p:spPr/>
-        <p:txBody>
-          <a:bodyPr/>
-          <a:lstStyle/>
-          <a:p>
-            <a:r>
-              <a:rPr lang="da-DK" dirty="0"/>
-              <a:t>Authentication for JWT </a:t>
-            </a:r>
-            <a:r>
-              <a:rPr lang="da-DK" dirty="0" err="1"/>
-              <a:t>token</a:t>
-            </a:r>
-            <a:endParaRPr lang="da-DK" dirty="0"/>
-          </a:p>
-          <a:p>
-            <a:r>
-              <a:rPr lang="da-DK" dirty="0" err="1"/>
-              <a:t>Role</a:t>
-            </a:r>
-            <a:r>
-              <a:rPr lang="da-DK" dirty="0"/>
-              <a:t> </a:t>
-            </a:r>
-            <a:r>
-              <a:rPr lang="da-DK" dirty="0" err="1"/>
-              <a:t>based</a:t>
-            </a:r>
-            <a:r>
-              <a:rPr lang="da-DK" dirty="0"/>
-              <a:t> </a:t>
-            </a:r>
-            <a:r>
-              <a:rPr lang="da-DK" dirty="0" err="1"/>
-              <a:t>access</a:t>
-            </a:r>
-            <a:r>
-              <a:rPr lang="da-DK" dirty="0"/>
-              <a:t> </a:t>
-            </a:r>
-            <a:r>
-              <a:rPr lang="da-DK" dirty="0" err="1"/>
-              <a:t>control</a:t>
-            </a:r>
-            <a:endParaRPr lang="en-US" dirty="0"/>
-          </a:p>
-        </p:txBody>
-      </p:sp>
+        </p:nvPicPr>
+        <p:blipFill>
+          <a:blip r:embed="rId2">
+            <a:extLst>
+              <a:ext uri="{28A0092B-C50C-407E-A947-70E740481C1C}">
+                <a14:useLocalDpi xmlns:a14="http://schemas.microsoft.com/office/drawing/2010/main" val="0"/>
+              </a:ext>
+            </a:extLst>
+          </a:blip>
+          <a:stretch>
+            <a:fillRect/>
+          </a:stretch>
+        </p:blipFill>
+        <p:spPr>
+          <a:xfrm>
+            <a:off x="1301486" y="1905138"/>
+            <a:ext cx="5549765" cy="4351338"/>
+          </a:xfrm>
+        </p:spPr>
+      </p:pic>
     </p:spTree>
     <p:extLst>
       <p:ext uri="{BB962C8B-B14F-4D97-AF65-F5344CB8AC3E}">
-        <p14:creationId xmlns:p14="http://schemas.microsoft.com/office/powerpoint/2010/main" val="2758313692"/>
+        <p14:creationId xmlns:p14="http://schemas.microsoft.com/office/powerpoint/2010/main" val="315548689"/>
       </p:ext>
     </p:extLst>
   </p:cSld>
@@ -6581,7 +6707,7 @@
           <p:cNvPr id="2" name="Title 1">
             <a:extLst>
               <a:ext uri="{FF2B5EF4-FFF2-40B4-BE49-F238E27FC236}">
-                <a16:creationId xmlns:a16="http://schemas.microsoft.com/office/drawing/2014/main" id="{F73FA1DB-C0A6-3AC9-7809-227394474E99}"/>
+                <a16:creationId xmlns:a16="http://schemas.microsoft.com/office/drawing/2014/main" id="{B7249B7F-1E50-0EC6-BC30-758241B9B049}"/>
               </a:ext>
             </a:extLst>
           </p:cNvPr>
@@ -6599,7 +6725,7 @@
           <a:p>
             <a:r>
               <a:rPr lang="da-DK" dirty="0"/>
-              <a:t>Asset Management API</a:t>
+              <a:t>Technology</a:t>
             </a:r>
             <a:endParaRPr lang="en-US" dirty="0"/>
           </a:p>
@@ -6610,7 +6736,7 @@
           <p:cNvPr id="3" name="Content Placeholder 2">
             <a:extLst>
               <a:ext uri="{FF2B5EF4-FFF2-40B4-BE49-F238E27FC236}">
-                <a16:creationId xmlns:a16="http://schemas.microsoft.com/office/drawing/2014/main" id="{184254C1-79A2-6A00-C13E-06216805DFF1}"/>
+                <a16:creationId xmlns:a16="http://schemas.microsoft.com/office/drawing/2014/main" id="{92B3F3E2-C88B-22D2-52CB-833B8347D1B0}"/>
               </a:ext>
             </a:extLst>
           </p:cNvPr>
@@ -6628,40 +6754,74 @@
           <a:p>
             <a:r>
               <a:rPr lang="da-DK" dirty="0" err="1"/>
-              <a:t>Get</a:t>
-            </a:r>
-            <a:r>
-              <a:rPr lang="da-DK" dirty="0"/>
-              <a:t> all, </a:t>
-            </a:r>
-            <a:r>
-              <a:rPr lang="da-DK" dirty="0" err="1"/>
-              <a:t>Get</a:t>
-            </a:r>
-            <a:r>
-              <a:rPr lang="da-DK" dirty="0"/>
-              <a:t> by ID</a:t>
-            </a:r>
-          </a:p>
-          <a:p>
-            <a:r>
-              <a:rPr lang="da-DK" dirty="0"/>
-              <a:t>Post</a:t>
-            </a:r>
-          </a:p>
-          <a:p>
-            <a:r>
-              <a:rPr lang="da-DK" dirty="0"/>
-              <a:t>Put</a:t>
-            </a:r>
-          </a:p>
-          <a:p>
-            <a:r>
-              <a:rPr lang="da-DK" dirty="0"/>
-              <a:t>Delete</a:t>
-            </a:r>
-          </a:p>
-          <a:p>
+              <a:t>Backend</a:t>
+            </a:r>
+            <a:r>
+              <a:rPr lang="da-DK" dirty="0"/>
+              <a:t>: ASP.NET core </a:t>
+            </a:r>
+            <a:r>
+              <a:rPr lang="da-DK" dirty="0" err="1"/>
+              <a:t>webAPI</a:t>
+            </a:r>
+            <a:endParaRPr lang="da-DK" dirty="0"/>
+          </a:p>
+          <a:p>
+            <a:r>
+              <a:rPr lang="da-DK" dirty="0"/>
+              <a:t>Database: In </a:t>
+            </a:r>
+            <a:r>
+              <a:rPr lang="da-DK" dirty="0" err="1"/>
+              <a:t>momory</a:t>
+            </a:r>
+            <a:r>
+              <a:rPr lang="da-DK" dirty="0"/>
+              <a:t> database, EF</a:t>
+            </a:r>
+          </a:p>
+          <a:p>
+            <a:r>
+              <a:rPr lang="da-DK" dirty="0"/>
+              <a:t>Authentication: JWT</a:t>
+            </a:r>
+          </a:p>
+          <a:p>
+            <a:r>
+              <a:rPr lang="da-DK" dirty="0"/>
+              <a:t>Test: </a:t>
+            </a:r>
+            <a:r>
+              <a:rPr lang="da-DK" dirty="0" err="1"/>
+              <a:t>Nunit</a:t>
+            </a:r>
+            <a:r>
+              <a:rPr lang="da-DK" dirty="0"/>
+              <a:t>, </a:t>
+            </a:r>
+            <a:r>
+              <a:rPr lang="da-DK" dirty="0" err="1"/>
+              <a:t>Moq</a:t>
+            </a:r>
+            <a:r>
+              <a:rPr lang="da-DK" dirty="0"/>
+              <a:t>, </a:t>
+            </a:r>
+            <a:r>
+              <a:rPr lang="da-DK" dirty="0" err="1"/>
+              <a:t>FluentValidation</a:t>
+            </a:r>
+            <a:endParaRPr lang="da-DK" dirty="0"/>
+          </a:p>
+          <a:p>
+            <a:r>
+              <a:rPr lang="da-DK" dirty="0"/>
+              <a:t>Tool: VS, </a:t>
+            </a:r>
+            <a:r>
+              <a:rPr lang="da-DK" dirty="0" err="1"/>
+              <a:t>Postman</a:t>
+            </a:r>
             <a:endParaRPr lang="en-US" dirty="0"/>
           </a:p>
         </p:txBody>
@@ -6669,7 +6829,7 @@
     </p:spTree>
     <p:extLst>
       <p:ext uri="{BB962C8B-B14F-4D97-AF65-F5344CB8AC3E}">
-        <p14:creationId xmlns:p14="http://schemas.microsoft.com/office/powerpoint/2010/main" val="1787617459"/>
+        <p14:creationId xmlns:p14="http://schemas.microsoft.com/office/powerpoint/2010/main" val="1540710725"/>
       </p:ext>
     </p:extLst>
   </p:cSld>

</xml_diff>